<commit_message>
Updated syllabus and lecture 4
</commit_message>
<xml_diff>
--- a/lecture/lecture_week_04.pptx
+++ b/lecture/lecture_week_04.pptx
@@ -26,29 +26,32 @@
     <p:sldId id="278" r:id="rId20"/>
     <p:sldId id="269" r:id="rId21"/>
     <p:sldId id="286" r:id="rId22"/>
-    <p:sldId id="289" r:id="rId23"/>
-    <p:sldId id="283" r:id="rId24"/>
-    <p:sldId id="284" r:id="rId25"/>
-    <p:sldId id="285" r:id="rId26"/>
-    <p:sldId id="288" r:id="rId27"/>
-    <p:sldId id="291" r:id="rId28"/>
-    <p:sldId id="273" r:id="rId29"/>
-    <p:sldId id="272" r:id="rId30"/>
-    <p:sldId id="274" r:id="rId31"/>
-    <p:sldId id="295" r:id="rId32"/>
-    <p:sldId id="296" r:id="rId33"/>
-    <p:sldId id="293" r:id="rId34"/>
-    <p:sldId id="294" r:id="rId35"/>
-    <p:sldId id="275" r:id="rId36"/>
-    <p:sldId id="276" r:id="rId37"/>
-    <p:sldId id="277" r:id="rId38"/>
-    <p:sldId id="292" r:id="rId39"/>
-    <p:sldId id="297" r:id="rId40"/>
-    <p:sldId id="298" r:id="rId41"/>
-    <p:sldId id="299" r:id="rId42"/>
-    <p:sldId id="300" r:id="rId43"/>
-    <p:sldId id="301" r:id="rId44"/>
-    <p:sldId id="302" r:id="rId45"/>
+    <p:sldId id="305" r:id="rId23"/>
+    <p:sldId id="289" r:id="rId24"/>
+    <p:sldId id="283" r:id="rId25"/>
+    <p:sldId id="284" r:id="rId26"/>
+    <p:sldId id="285" r:id="rId27"/>
+    <p:sldId id="288" r:id="rId28"/>
+    <p:sldId id="291" r:id="rId29"/>
+    <p:sldId id="273" r:id="rId30"/>
+    <p:sldId id="272" r:id="rId31"/>
+    <p:sldId id="274" r:id="rId32"/>
+    <p:sldId id="295" r:id="rId33"/>
+    <p:sldId id="296" r:id="rId34"/>
+    <p:sldId id="293" r:id="rId35"/>
+    <p:sldId id="294" r:id="rId36"/>
+    <p:sldId id="275" r:id="rId37"/>
+    <p:sldId id="276" r:id="rId38"/>
+    <p:sldId id="277" r:id="rId39"/>
+    <p:sldId id="292" r:id="rId40"/>
+    <p:sldId id="297" r:id="rId41"/>
+    <p:sldId id="298" r:id="rId42"/>
+    <p:sldId id="299" r:id="rId43"/>
+    <p:sldId id="300" r:id="rId44"/>
+    <p:sldId id="301" r:id="rId45"/>
+    <p:sldId id="302" r:id="rId46"/>
+    <p:sldId id="303" r:id="rId47"/>
+    <p:sldId id="304" r:id="rId48"/>
   </p:sldIdLst>
   <p:sldSz cx="12192000" cy="6858000"/>
   <p:notesSz cx="6858000" cy="9144000"/>
@@ -153,6 +156,97 @@
     </p:ext>
   </p:extLst>
 </p:presentation>
+</file>
+
+<file path=ppt/revisionInfo.xml><?xml version="1.0" encoding="utf-8"?>
+<p1510:revInfo xmlns:a="http://schemas.openxmlformats.org/drawingml/2006/main" xmlns:r="http://schemas.openxmlformats.org/officeDocument/2006/relationships" xmlns:p1510="http://schemas.microsoft.com/office/powerpoint/2015/10/main">
+  <p1510:revLst>
+    <p1510:client id="{8A7B83BE-D3A2-416F-B8C2-73F6AE1679DD}" v="1" dt="2021-10-04T18:02:07.371"/>
+  </p1510:revLst>
+</p1510:revInfo>
+</file>
+
+<file path=ppt/changesInfos/changesInfo1.xml><?xml version="1.0" encoding="utf-8"?>
+<pc:chgInfo xmlns:a="http://schemas.openxmlformats.org/drawingml/2006/main" xmlns:r="http://schemas.openxmlformats.org/officeDocument/2006/relationships" xmlns:ac="http://schemas.microsoft.com/office/drawing/2013/main/command" xmlns:pc="http://schemas.microsoft.com/office/powerpoint/2013/main/command">
+  <pc:docChgLst>
+    <pc:chgData name="Steffen Foerster" userId="df395535-b300-4ba1-b511-699db02f1bec" providerId="ADAL" clId="{8A7B83BE-D3A2-416F-B8C2-73F6AE1679DD}"/>
+    <pc:docChg chg="custSel addSld modSld">
+      <pc:chgData name="Steffen Foerster" userId="df395535-b300-4ba1-b511-699db02f1bec" providerId="ADAL" clId="{8A7B83BE-D3A2-416F-B8C2-73F6AE1679DD}" dt="2021-10-04T18:02:07.371" v="390"/>
+      <pc:docMkLst>
+        <pc:docMk/>
+      </pc:docMkLst>
+      <pc:sldChg chg="modSp new mod">
+        <pc:chgData name="Steffen Foerster" userId="df395535-b300-4ba1-b511-699db02f1bec" providerId="ADAL" clId="{8A7B83BE-D3A2-416F-B8C2-73F6AE1679DD}" dt="2021-10-04T17:47:25.593" v="9" actId="20577"/>
+        <pc:sldMkLst>
+          <pc:docMk/>
+          <pc:sldMk cId="3109420170" sldId="303"/>
+        </pc:sldMkLst>
+        <pc:spChg chg="mod">
+          <ac:chgData name="Steffen Foerster" userId="df395535-b300-4ba1-b511-699db02f1bec" providerId="ADAL" clId="{8A7B83BE-D3A2-416F-B8C2-73F6AE1679DD}" dt="2021-10-04T17:47:25.593" v="9" actId="20577"/>
+          <ac:spMkLst>
+            <pc:docMk/>
+            <pc:sldMk cId="3109420170" sldId="303"/>
+            <ac:spMk id="2" creationId="{504E7F82-AB43-41C2-B5D9-E7D50BE83A4C}"/>
+          </ac:spMkLst>
+        </pc:spChg>
+      </pc:sldChg>
+      <pc:sldChg chg="modSp new mod">
+        <pc:chgData name="Steffen Foerster" userId="df395535-b300-4ba1-b511-699db02f1bec" providerId="ADAL" clId="{8A7B83BE-D3A2-416F-B8C2-73F6AE1679DD}" dt="2021-10-04T18:00:09.138" v="363" actId="20577"/>
+        <pc:sldMkLst>
+          <pc:docMk/>
+          <pc:sldMk cId="3709092660" sldId="304"/>
+        </pc:sldMkLst>
+        <pc:spChg chg="mod">
+          <ac:chgData name="Steffen Foerster" userId="df395535-b300-4ba1-b511-699db02f1bec" providerId="ADAL" clId="{8A7B83BE-D3A2-416F-B8C2-73F6AE1679DD}" dt="2021-10-04T17:53:51.141" v="142" actId="20577"/>
+          <ac:spMkLst>
+            <pc:docMk/>
+            <pc:sldMk cId="3709092660" sldId="304"/>
+            <ac:spMk id="2" creationId="{DD371923-B3C2-40B0-B81E-331D3C77B2C1}"/>
+          </ac:spMkLst>
+        </pc:spChg>
+        <pc:spChg chg="mod">
+          <ac:chgData name="Steffen Foerster" userId="df395535-b300-4ba1-b511-699db02f1bec" providerId="ADAL" clId="{8A7B83BE-D3A2-416F-B8C2-73F6AE1679DD}" dt="2021-10-04T18:00:09.138" v="363" actId="20577"/>
+          <ac:spMkLst>
+            <pc:docMk/>
+            <pc:sldMk cId="3709092660" sldId="304"/>
+            <ac:spMk id="3" creationId="{9B6B75C9-DE3D-4C99-BBA9-774B87CBF801}"/>
+          </ac:spMkLst>
+        </pc:spChg>
+      </pc:sldChg>
+      <pc:sldChg chg="addSp delSp modSp new mod">
+        <pc:chgData name="Steffen Foerster" userId="df395535-b300-4ba1-b511-699db02f1bec" providerId="ADAL" clId="{8A7B83BE-D3A2-416F-B8C2-73F6AE1679DD}" dt="2021-10-04T18:02:07.371" v="390"/>
+        <pc:sldMkLst>
+          <pc:docMk/>
+          <pc:sldMk cId="2363605311" sldId="305"/>
+        </pc:sldMkLst>
+        <pc:spChg chg="mod">
+          <ac:chgData name="Steffen Foerster" userId="df395535-b300-4ba1-b511-699db02f1bec" providerId="ADAL" clId="{8A7B83BE-D3A2-416F-B8C2-73F6AE1679DD}" dt="2021-10-04T18:02:03.620" v="389" actId="20577"/>
+          <ac:spMkLst>
+            <pc:docMk/>
+            <pc:sldMk cId="2363605311" sldId="305"/>
+            <ac:spMk id="2" creationId="{62C84379-0181-4D8B-A139-90C48530DC98}"/>
+          </ac:spMkLst>
+        </pc:spChg>
+        <pc:spChg chg="del">
+          <ac:chgData name="Steffen Foerster" userId="df395535-b300-4ba1-b511-699db02f1bec" providerId="ADAL" clId="{8A7B83BE-D3A2-416F-B8C2-73F6AE1679DD}" dt="2021-10-04T18:02:07.371" v="390"/>
+          <ac:spMkLst>
+            <pc:docMk/>
+            <pc:sldMk cId="2363605311" sldId="305"/>
+            <ac:spMk id="3" creationId="{2E9A6DF6-40DC-41E8-8E90-97DAA83E8EBF}"/>
+          </ac:spMkLst>
+        </pc:spChg>
+        <pc:picChg chg="add mod">
+          <ac:chgData name="Steffen Foerster" userId="df395535-b300-4ba1-b511-699db02f1bec" providerId="ADAL" clId="{8A7B83BE-D3A2-416F-B8C2-73F6AE1679DD}" dt="2021-10-04T18:02:07.371" v="390"/>
+          <ac:picMkLst>
+            <pc:docMk/>
+            <pc:sldMk cId="2363605311" sldId="305"/>
+            <ac:picMk id="4" creationId="{BD3E4C6F-BA2F-4973-B763-A3524D558334}"/>
+          </ac:picMkLst>
+        </pc:picChg>
+      </pc:sldChg>
+    </pc:docChg>
+  </pc:docChgLst>
+</pc:chgInfo>
 </file>
 
 <file path=ppt/slideLayouts/slideLayout1.xml><?xml version="1.0" encoding="utf-8"?>
@@ -5383,7 +5477,7 @@
           <p:cNvPr id="2" name="Title 1">
             <a:extLst>
               <a:ext uri="{FF2B5EF4-FFF2-40B4-BE49-F238E27FC236}">
-                <a16:creationId xmlns:a16="http://schemas.microsoft.com/office/drawing/2014/main" id="{A7CBA6B2-6FF3-4B77-8D3D-98B7E62A09EC}"/>
+                <a16:creationId xmlns:a16="http://schemas.microsoft.com/office/drawing/2014/main" id="{62C84379-0181-4D8B-A139-90C48530DC98}"/>
               </a:ext>
             </a:extLst>
           </p:cNvPr>
@@ -5401,45 +5495,47 @@
           <a:p>
             <a:r>
               <a:rPr lang="en-US" dirty="0"/>
-              <a:t>More about distributions next week when we talk </a:t>
-            </a:r>
-            <a:r>
-              <a:rPr lang="en-US"/>
-              <a:t>about probability</a:t>
-            </a:r>
-            <a:endParaRPr lang="en-US" dirty="0"/>
-          </a:p>
-        </p:txBody>
-      </p:sp>
-      <p:sp>
-        <p:nvSpPr>
-          <p:cNvPr id="4" name="Text Placeholder 3">
-            <a:extLst>
-              <a:ext uri="{FF2B5EF4-FFF2-40B4-BE49-F238E27FC236}">
-                <a16:creationId xmlns:a16="http://schemas.microsoft.com/office/drawing/2014/main" id="{BC1077B7-C519-43EA-8BA2-DDA02A5A8F89}"/>
-              </a:ext>
-            </a:extLst>
-          </p:cNvPr>
-          <p:cNvSpPr>
-            <a:spLocks noGrp="1"/>
-          </p:cNvSpPr>
-          <p:nvPr>
-            <p:ph type="body" idx="1"/>
-          </p:nvPr>
-        </p:nvSpPr>
-        <p:spPr/>
-        <p:txBody>
-          <a:bodyPr/>
-          <a:lstStyle/>
-          <a:p>
-            <a:endParaRPr lang="en-US"/>
-          </a:p>
-        </p:txBody>
-      </p:sp>
+              <a:t>Normal distribution</a:t>
+            </a:r>
+          </a:p>
+        </p:txBody>
+      </p:sp>
+      <p:pic>
+        <p:nvPicPr>
+          <p:cNvPr id="4" name="Content Placeholder 3">
+            <a:extLst>
+              <a:ext uri="{FF2B5EF4-FFF2-40B4-BE49-F238E27FC236}">
+                <a16:creationId xmlns:a16="http://schemas.microsoft.com/office/drawing/2014/main" id="{BD3E4C6F-BA2F-4973-B763-A3524D558334}"/>
+              </a:ext>
+            </a:extLst>
+          </p:cNvPr>
+          <p:cNvPicPr>
+            <a:picLocks noGrp="1" noChangeAspect="1"/>
+          </p:cNvPicPr>
+          <p:nvPr>
+            <p:ph idx="1"/>
+          </p:nvPr>
+        </p:nvPicPr>
+        <p:blipFill>
+          <a:blip r:embed="rId2"/>
+          <a:stretch>
+            <a:fillRect/>
+          </a:stretch>
+        </p:blipFill>
+        <p:spPr>
+          <a:xfrm>
+            <a:off x="1744662" y="1825625"/>
+            <a:ext cx="8702676" cy="4351338"/>
+          </a:xfrm>
+          <a:prstGeom prst="rect">
+            <a:avLst/>
+          </a:prstGeom>
+        </p:spPr>
+      </p:pic>
     </p:spTree>
     <p:extLst>
       <p:ext uri="{BB962C8B-B14F-4D97-AF65-F5344CB8AC3E}">
-        <p14:creationId xmlns:p14="http://schemas.microsoft.com/office/powerpoint/2010/main" val="809075301"/>
+        <p14:creationId xmlns:p14="http://schemas.microsoft.com/office/powerpoint/2010/main" val="2363605311"/>
       </p:ext>
     </p:extLst>
   </p:cSld>
@@ -5471,7 +5567,7 @@
           <p:cNvPr id="2" name="Title 1">
             <a:extLst>
               <a:ext uri="{FF2B5EF4-FFF2-40B4-BE49-F238E27FC236}">
-                <a16:creationId xmlns:a16="http://schemas.microsoft.com/office/drawing/2014/main" id="{08576335-7EEE-46E5-8DBF-1C57E03C28DF}"/>
+                <a16:creationId xmlns:a16="http://schemas.microsoft.com/office/drawing/2014/main" id="{A7CBA6B2-6FF3-4B77-8D3D-98B7E62A09EC}"/>
               </a:ext>
             </a:extLst>
           </p:cNvPr>
@@ -5482,86 +5578,52 @@
             <p:ph type="title"/>
           </p:nvPr>
         </p:nvSpPr>
-        <p:spPr>
-          <a:xfrm>
-            <a:off x="838200" y="365125"/>
-            <a:ext cx="10515600" cy="1325563"/>
-          </a:xfrm>
-        </p:spPr>
+        <p:spPr/>
         <p:txBody>
           <a:bodyPr/>
           <a:lstStyle/>
           <a:p>
             <a:r>
               <a:rPr lang="en-US" dirty="0"/>
-              <a:t>Measure of center: Median</a:t>
-            </a:r>
-          </a:p>
-        </p:txBody>
-      </p:sp>
-      <p:sp>
-        <p:nvSpPr>
-          <p:cNvPr id="3" name="Content Placeholder 2">
-            <a:extLst>
-              <a:ext uri="{FF2B5EF4-FFF2-40B4-BE49-F238E27FC236}">
-                <a16:creationId xmlns:a16="http://schemas.microsoft.com/office/drawing/2014/main" id="{4779CC4D-4287-449E-A7F3-AB1BA2A7C052}"/>
-              </a:ext>
-            </a:extLst>
-          </p:cNvPr>
-          <p:cNvSpPr>
-            <a:spLocks noGrp="1"/>
-          </p:cNvSpPr>
-          <p:nvPr>
-            <p:ph idx="1"/>
-          </p:nvPr>
-        </p:nvSpPr>
-        <p:spPr>
-          <a:xfrm>
-            <a:off x="838200" y="1825625"/>
-            <a:ext cx="10515600" cy="4351338"/>
-          </a:xfrm>
-        </p:spPr>
-        <p:txBody>
-          <a:bodyPr/>
-          <a:lstStyle/>
-          <a:p>
-            <a:r>
-              <a:rPr lang="en-US" dirty="0"/>
-              <a:t>The median is the value of the middle observation in a sample.</a:t>
-            </a:r>
-          </a:p>
-          <a:p>
-            <a:r>
-              <a:rPr lang="en-US" dirty="0"/>
-              <a:t>If the number of observations is</a:t>
-            </a:r>
-          </a:p>
-          <a:p>
-            <a:pPr lvl="1"/>
-            <a:r>
-              <a:rPr lang="en-US" dirty="0"/>
-              <a:t>Odd, the median is the middle observation</a:t>
-            </a:r>
-          </a:p>
-          <a:p>
-            <a:pPr lvl="1"/>
-            <a:r>
-              <a:rPr lang="en-US" dirty="0"/>
-              <a:t>Even, the median is the average of the two middle observations</a:t>
-            </a:r>
-          </a:p>
-          <a:p>
-            <a:r>
-              <a:rPr lang="en-US" dirty="0"/>
-              <a:t>The median is the 50th percentile; 50% of observations lie below/above the median.</a:t>
-            </a:r>
+              <a:t>More about distributions next week when we talk </a:t>
+            </a:r>
+            <a:r>
+              <a:rPr lang="en-US"/>
+              <a:t>about probability</a:t>
+            </a:r>
+            <a:endParaRPr lang="en-US" dirty="0"/>
+          </a:p>
+        </p:txBody>
+      </p:sp>
+      <p:sp>
+        <p:nvSpPr>
+          <p:cNvPr id="4" name="Text Placeholder 3">
+            <a:extLst>
+              <a:ext uri="{FF2B5EF4-FFF2-40B4-BE49-F238E27FC236}">
+                <a16:creationId xmlns:a16="http://schemas.microsoft.com/office/drawing/2014/main" id="{BC1077B7-C519-43EA-8BA2-DDA02A5A8F89}"/>
+              </a:ext>
+            </a:extLst>
+          </p:cNvPr>
+          <p:cNvSpPr>
+            <a:spLocks noGrp="1"/>
+          </p:cNvSpPr>
+          <p:nvPr>
+            <p:ph type="body" idx="1"/>
+          </p:nvPr>
+        </p:nvSpPr>
+        <p:spPr/>
+        <p:txBody>
+          <a:bodyPr/>
+          <a:lstStyle/>
+          <a:p>
+            <a:endParaRPr lang="en-US"/>
           </a:p>
         </p:txBody>
       </p:sp>
     </p:spTree>
     <p:extLst>
       <p:ext uri="{BB962C8B-B14F-4D97-AF65-F5344CB8AC3E}">
-        <p14:creationId xmlns:p14="http://schemas.microsoft.com/office/powerpoint/2010/main" val="438304214"/>
+        <p14:creationId xmlns:p14="http://schemas.microsoft.com/office/powerpoint/2010/main" val="809075301"/>
       </p:ext>
     </p:extLst>
   </p:cSld>
@@ -5593,7 +5655,7 @@
           <p:cNvPr id="2" name="Title 1">
             <a:extLst>
               <a:ext uri="{FF2B5EF4-FFF2-40B4-BE49-F238E27FC236}">
-                <a16:creationId xmlns:a16="http://schemas.microsoft.com/office/drawing/2014/main" id="{1B950067-DC69-4C61-A0DD-8587DC13331E}"/>
+                <a16:creationId xmlns:a16="http://schemas.microsoft.com/office/drawing/2014/main" id="{08576335-7EEE-46E5-8DBF-1C57E03C28DF}"/>
               </a:ext>
             </a:extLst>
           </p:cNvPr>
@@ -5604,51 +5666,86 @@
             <p:ph type="title"/>
           </p:nvPr>
         </p:nvSpPr>
-        <p:spPr/>
+        <p:spPr>
+          <a:xfrm>
+            <a:off x="838200" y="365125"/>
+            <a:ext cx="10515600" cy="1325563"/>
+          </a:xfrm>
+        </p:spPr>
         <p:txBody>
           <a:bodyPr/>
           <a:lstStyle/>
           <a:p>
             <a:r>
               <a:rPr lang="en-US" dirty="0"/>
-              <a:t>Measure of spread: Percentiles</a:t>
-            </a:r>
-          </a:p>
-        </p:txBody>
-      </p:sp>
-      <p:pic>
-        <p:nvPicPr>
-          <p:cNvPr id="5" name="Content Placeholder 4">
-            <a:extLst>
-              <a:ext uri="{FF2B5EF4-FFF2-40B4-BE49-F238E27FC236}">
-                <a16:creationId xmlns:a16="http://schemas.microsoft.com/office/drawing/2014/main" id="{48476C2E-E8A6-43C2-838B-F58B83279017}"/>
-              </a:ext>
-            </a:extLst>
-          </p:cNvPr>
-          <p:cNvPicPr>
-            <a:picLocks noGrp="1" noChangeAspect="1"/>
-          </p:cNvPicPr>
+              <a:t>Measure of center: Median</a:t>
+            </a:r>
+          </a:p>
+        </p:txBody>
+      </p:sp>
+      <p:sp>
+        <p:nvSpPr>
+          <p:cNvPr id="3" name="Content Placeholder 2">
+            <a:extLst>
+              <a:ext uri="{FF2B5EF4-FFF2-40B4-BE49-F238E27FC236}">
+                <a16:creationId xmlns:a16="http://schemas.microsoft.com/office/drawing/2014/main" id="{4779CC4D-4287-449E-A7F3-AB1BA2A7C052}"/>
+              </a:ext>
+            </a:extLst>
+          </p:cNvPr>
+          <p:cNvSpPr>
+            <a:spLocks noGrp="1"/>
+          </p:cNvSpPr>
           <p:nvPr>
             <p:ph idx="1"/>
           </p:nvPr>
-        </p:nvPicPr>
-        <p:blipFill>
-          <a:blip r:embed="rId2"/>
-          <a:stretch>
-            <a:fillRect/>
-          </a:stretch>
-        </p:blipFill>
+        </p:nvSpPr>
         <p:spPr>
           <a:xfrm>
-            <a:off x="838200" y="1690688"/>
-            <a:ext cx="10515600" cy="3160169"/>
-          </a:xfrm>
-        </p:spPr>
-      </p:pic>
+            <a:off x="838200" y="1825625"/>
+            <a:ext cx="10515600" cy="4351338"/>
+          </a:xfrm>
+        </p:spPr>
+        <p:txBody>
+          <a:bodyPr/>
+          <a:lstStyle/>
+          <a:p>
+            <a:r>
+              <a:rPr lang="en-US" dirty="0"/>
+              <a:t>The median is the value of the middle observation in a sample.</a:t>
+            </a:r>
+          </a:p>
+          <a:p>
+            <a:r>
+              <a:rPr lang="en-US" dirty="0"/>
+              <a:t>If the number of observations is</a:t>
+            </a:r>
+          </a:p>
+          <a:p>
+            <a:pPr lvl="1"/>
+            <a:r>
+              <a:rPr lang="en-US" dirty="0"/>
+              <a:t>Odd, the median is the middle observation</a:t>
+            </a:r>
+          </a:p>
+          <a:p>
+            <a:pPr lvl="1"/>
+            <a:r>
+              <a:rPr lang="en-US" dirty="0"/>
+              <a:t>Even, the median is the average of the two middle observations</a:t>
+            </a:r>
+          </a:p>
+          <a:p>
+            <a:r>
+              <a:rPr lang="en-US" dirty="0"/>
+              <a:t>The median is the 50th percentile; 50% of observations lie below/above the median.</a:t>
+            </a:r>
+          </a:p>
+        </p:txBody>
+      </p:sp>
     </p:spTree>
     <p:extLst>
       <p:ext uri="{BB962C8B-B14F-4D97-AF65-F5344CB8AC3E}">
-        <p14:creationId xmlns:p14="http://schemas.microsoft.com/office/powerpoint/2010/main" val="3161999701"/>
+        <p14:creationId xmlns:p14="http://schemas.microsoft.com/office/powerpoint/2010/main" val="438304214"/>
       </p:ext>
     </p:extLst>
   </p:cSld>
@@ -5680,7 +5777,7 @@
           <p:cNvPr id="2" name="Title 1">
             <a:extLst>
               <a:ext uri="{FF2B5EF4-FFF2-40B4-BE49-F238E27FC236}">
-                <a16:creationId xmlns:a16="http://schemas.microsoft.com/office/drawing/2014/main" id="{D54E62A3-A712-43AE-9F03-0432EC696591}"/>
+                <a16:creationId xmlns:a16="http://schemas.microsoft.com/office/drawing/2014/main" id="{1B950067-DC69-4C61-A0DD-8587DC13331E}"/>
               </a:ext>
             </a:extLst>
           </p:cNvPr>
@@ -5691,77 +5788,33 @@
             <p:ph type="title"/>
           </p:nvPr>
         </p:nvSpPr>
-        <p:spPr>
-          <a:xfrm>
-            <a:off x="838200" y="365125"/>
-            <a:ext cx="10515600" cy="1325563"/>
-          </a:xfrm>
-        </p:spPr>
+        <p:spPr/>
         <p:txBody>
           <a:bodyPr/>
           <a:lstStyle/>
           <a:p>
             <a:r>
               <a:rPr lang="en-US" dirty="0"/>
-              <a:t>Robust estimates</a:t>
-            </a:r>
-          </a:p>
-        </p:txBody>
-      </p:sp>
-      <p:sp>
-        <p:nvSpPr>
-          <p:cNvPr id="3" name="Content Placeholder 2">
-            <a:extLst>
-              <a:ext uri="{FF2B5EF4-FFF2-40B4-BE49-F238E27FC236}">
-                <a16:creationId xmlns:a16="http://schemas.microsoft.com/office/drawing/2014/main" id="{D84FC075-0F7E-4940-A5A6-F28184CDB262}"/>
-              </a:ext>
-            </a:extLst>
-          </p:cNvPr>
-          <p:cNvSpPr>
-            <a:spLocks noGrp="1"/>
-          </p:cNvSpPr>
-          <p:nvPr>
-            <p:ph idx="1"/>
-          </p:nvPr>
-        </p:nvSpPr>
-        <p:spPr>
-          <a:xfrm>
-            <a:off x="838200" y="1825625"/>
-            <a:ext cx="10515600" cy="4351338"/>
-          </a:xfrm>
-        </p:spPr>
-        <p:txBody>
-          <a:bodyPr>
-            <a:normAutofit/>
-          </a:bodyPr>
-          <a:lstStyle/>
-          <a:p>
-            <a:r>
-              <a:rPr lang="en-US" sz="2400" dirty="0"/>
-              <a:t>The median and IQR are called robust estimates because they are less likely to be affected by extreme values than the mean and standard deviation.</a:t>
-            </a:r>
-          </a:p>
-          <a:p>
-            <a:r>
-              <a:rPr lang="en-US" sz="2400" dirty="0"/>
-              <a:t>For distributions containing extreme observations, the median and IQR provide a more accurate sense of center and spread.</a:t>
+              <a:t>Measure of spread: Percentiles</a:t>
             </a:r>
           </a:p>
         </p:txBody>
       </p:sp>
       <p:pic>
         <p:nvPicPr>
-          <p:cNvPr id="5" name="Picture 4">
-            <a:extLst>
-              <a:ext uri="{FF2B5EF4-FFF2-40B4-BE49-F238E27FC236}">
-                <a16:creationId xmlns:a16="http://schemas.microsoft.com/office/drawing/2014/main" id="{CA5818D0-1E05-4A2E-9688-7102897C82C4}"/>
+          <p:cNvPr id="5" name="Content Placeholder 4">
+            <a:extLst>
+              <a:ext uri="{FF2B5EF4-FFF2-40B4-BE49-F238E27FC236}">
+                <a16:creationId xmlns:a16="http://schemas.microsoft.com/office/drawing/2014/main" id="{48476C2E-E8A6-43C2-838B-F58B83279017}"/>
               </a:ext>
             </a:extLst>
           </p:cNvPr>
           <p:cNvPicPr>
-            <a:picLocks noChangeAspect="1"/>
+            <a:picLocks noGrp="1" noChangeAspect="1"/>
           </p:cNvPicPr>
-          <p:nvPr/>
+          <p:nvPr>
+            <p:ph idx="1"/>
+          </p:nvPr>
         </p:nvPicPr>
         <p:blipFill>
           <a:blip r:embed="rId2"/>
@@ -5771,48 +5824,15 @@
         </p:blipFill>
         <p:spPr>
           <a:xfrm>
-            <a:off x="838200" y="3354233"/>
-            <a:ext cx="8911849" cy="1670487"/>
-          </a:xfrm>
-          <a:prstGeom prst="rect">
-            <a:avLst/>
-          </a:prstGeom>
-        </p:spPr>
-      </p:pic>
-      <p:pic>
-        <p:nvPicPr>
-          <p:cNvPr id="7" name="Picture 6">
-            <a:extLst>
-              <a:ext uri="{FF2B5EF4-FFF2-40B4-BE49-F238E27FC236}">
-                <a16:creationId xmlns:a16="http://schemas.microsoft.com/office/drawing/2014/main" id="{49D05FAD-9DB6-4C10-B90D-56208884952F}"/>
-              </a:ext>
-            </a:extLst>
-          </p:cNvPr>
-          <p:cNvPicPr>
-            <a:picLocks noChangeAspect="1"/>
-          </p:cNvPicPr>
-          <p:nvPr/>
-        </p:nvPicPr>
-        <p:blipFill>
-          <a:blip r:embed="rId3"/>
-          <a:stretch>
-            <a:fillRect/>
-          </a:stretch>
-        </p:blipFill>
-        <p:spPr>
-          <a:xfrm>
-            <a:off x="2727670" y="5024720"/>
-            <a:ext cx="8824758" cy="1479445"/>
-          </a:xfrm>
-          <a:prstGeom prst="rect">
-            <a:avLst/>
-          </a:prstGeom>
+            <a:off x="838200" y="1690688"/>
+            <a:ext cx="10515600" cy="3160169"/>
+          </a:xfrm>
         </p:spPr>
       </p:pic>
     </p:spTree>
     <p:extLst>
       <p:ext uri="{BB962C8B-B14F-4D97-AF65-F5344CB8AC3E}">
-        <p14:creationId xmlns:p14="http://schemas.microsoft.com/office/powerpoint/2010/main" val="1395257555"/>
+        <p14:creationId xmlns:p14="http://schemas.microsoft.com/office/powerpoint/2010/main" val="3161999701"/>
       </p:ext>
     </p:extLst>
   </p:cSld>
@@ -5844,7 +5864,7 @@
           <p:cNvPr id="2" name="Title 1">
             <a:extLst>
               <a:ext uri="{FF2B5EF4-FFF2-40B4-BE49-F238E27FC236}">
-                <a16:creationId xmlns:a16="http://schemas.microsoft.com/office/drawing/2014/main" id="{335B8F5B-970A-4888-99E1-782DBAE31607}"/>
+                <a16:creationId xmlns:a16="http://schemas.microsoft.com/office/drawing/2014/main" id="{D54E62A3-A712-43AE-9F03-0432EC696591}"/>
               </a:ext>
             </a:extLst>
           </p:cNvPr>
@@ -5855,33 +5875,77 @@
             <p:ph type="title"/>
           </p:nvPr>
         </p:nvSpPr>
-        <p:spPr/>
+        <p:spPr>
+          <a:xfrm>
+            <a:off x="838200" y="365125"/>
+            <a:ext cx="10515600" cy="1325563"/>
+          </a:xfrm>
+        </p:spPr>
         <p:txBody>
           <a:bodyPr/>
           <a:lstStyle/>
           <a:p>
             <a:r>
               <a:rPr lang="en-US" dirty="0"/>
-              <a:t>Boxplots</a:t>
+              <a:t>Robust estimates</a:t>
+            </a:r>
+          </a:p>
+        </p:txBody>
+      </p:sp>
+      <p:sp>
+        <p:nvSpPr>
+          <p:cNvPr id="3" name="Content Placeholder 2">
+            <a:extLst>
+              <a:ext uri="{FF2B5EF4-FFF2-40B4-BE49-F238E27FC236}">
+                <a16:creationId xmlns:a16="http://schemas.microsoft.com/office/drawing/2014/main" id="{D84FC075-0F7E-4940-A5A6-F28184CDB262}"/>
+              </a:ext>
+            </a:extLst>
+          </p:cNvPr>
+          <p:cNvSpPr>
+            <a:spLocks noGrp="1"/>
+          </p:cNvSpPr>
+          <p:nvPr>
+            <p:ph idx="1"/>
+          </p:nvPr>
+        </p:nvSpPr>
+        <p:spPr>
+          <a:xfrm>
+            <a:off x="838200" y="1825625"/>
+            <a:ext cx="10515600" cy="4351338"/>
+          </a:xfrm>
+        </p:spPr>
+        <p:txBody>
+          <a:bodyPr>
+            <a:normAutofit/>
+          </a:bodyPr>
+          <a:lstStyle/>
+          <a:p>
+            <a:r>
+              <a:rPr lang="en-US" sz="2400" dirty="0"/>
+              <a:t>The median and IQR are called robust estimates because they are less likely to be affected by extreme values than the mean and standard deviation.</a:t>
+            </a:r>
+          </a:p>
+          <a:p>
+            <a:r>
+              <a:rPr lang="en-US" sz="2400" dirty="0"/>
+              <a:t>For distributions containing extreme observations, the median and IQR provide a more accurate sense of center and spread.</a:t>
             </a:r>
           </a:p>
         </p:txBody>
       </p:sp>
       <p:pic>
         <p:nvPicPr>
-          <p:cNvPr id="5" name="Content Placeholder 4">
-            <a:extLst>
-              <a:ext uri="{FF2B5EF4-FFF2-40B4-BE49-F238E27FC236}">
-                <a16:creationId xmlns:a16="http://schemas.microsoft.com/office/drawing/2014/main" id="{12C92E96-58CF-4829-B8DE-7122496FE5D0}"/>
+          <p:cNvPr id="5" name="Picture 4">
+            <a:extLst>
+              <a:ext uri="{FF2B5EF4-FFF2-40B4-BE49-F238E27FC236}">
+                <a16:creationId xmlns:a16="http://schemas.microsoft.com/office/drawing/2014/main" id="{CA5818D0-1E05-4A2E-9688-7102897C82C4}"/>
               </a:ext>
             </a:extLst>
           </p:cNvPr>
           <p:cNvPicPr>
-            <a:picLocks noGrp="1" noChangeAspect="1"/>
+            <a:picLocks noChangeAspect="1"/>
           </p:cNvPicPr>
-          <p:nvPr>
-            <p:ph idx="1"/>
-          </p:nvPr>
+          <p:nvPr/>
         </p:nvPicPr>
         <p:blipFill>
           <a:blip r:embed="rId2"/>
@@ -5891,15 +5955,48 @@
         </p:blipFill>
         <p:spPr>
           <a:xfrm>
-            <a:off x="3578087" y="452595"/>
-            <a:ext cx="7464497" cy="5952809"/>
-          </a:xfrm>
+            <a:off x="838200" y="3354233"/>
+            <a:ext cx="8911849" cy="1670487"/>
+          </a:xfrm>
+          <a:prstGeom prst="rect">
+            <a:avLst/>
+          </a:prstGeom>
+        </p:spPr>
+      </p:pic>
+      <p:pic>
+        <p:nvPicPr>
+          <p:cNvPr id="7" name="Picture 6">
+            <a:extLst>
+              <a:ext uri="{FF2B5EF4-FFF2-40B4-BE49-F238E27FC236}">
+                <a16:creationId xmlns:a16="http://schemas.microsoft.com/office/drawing/2014/main" id="{49D05FAD-9DB6-4C10-B90D-56208884952F}"/>
+              </a:ext>
+            </a:extLst>
+          </p:cNvPr>
+          <p:cNvPicPr>
+            <a:picLocks noChangeAspect="1"/>
+          </p:cNvPicPr>
+          <p:nvPr/>
+        </p:nvPicPr>
+        <p:blipFill>
+          <a:blip r:embed="rId3"/>
+          <a:stretch>
+            <a:fillRect/>
+          </a:stretch>
+        </p:blipFill>
+        <p:spPr>
+          <a:xfrm>
+            <a:off x="2727670" y="5024720"/>
+            <a:ext cx="8824758" cy="1479445"/>
+          </a:xfrm>
+          <a:prstGeom prst="rect">
+            <a:avLst/>
+          </a:prstGeom>
         </p:spPr>
       </p:pic>
     </p:spTree>
     <p:extLst>
       <p:ext uri="{BB962C8B-B14F-4D97-AF65-F5344CB8AC3E}">
-        <p14:creationId xmlns:p14="http://schemas.microsoft.com/office/powerpoint/2010/main" val="2786594713"/>
+        <p14:creationId xmlns:p14="http://schemas.microsoft.com/office/powerpoint/2010/main" val="1395257555"/>
       </p:ext>
     </p:extLst>
   </p:cSld>
@@ -5931,7 +6028,7 @@
           <p:cNvPr id="2" name="Title 1">
             <a:extLst>
               <a:ext uri="{FF2B5EF4-FFF2-40B4-BE49-F238E27FC236}">
-                <a16:creationId xmlns:a16="http://schemas.microsoft.com/office/drawing/2014/main" id="{A29184D8-C6A4-44BE-A09F-2BF0E95CEDA9}"/>
+                <a16:creationId xmlns:a16="http://schemas.microsoft.com/office/drawing/2014/main" id="{335B8F5B-970A-4888-99E1-782DBAE31607}"/>
               </a:ext>
             </a:extLst>
           </p:cNvPr>
@@ -5949,7 +6046,7 @@
           <a:p>
             <a:r>
               <a:rPr lang="en-US" dirty="0"/>
-              <a:t>Histograms and boxplots</a:t>
+              <a:t>Boxplots</a:t>
             </a:r>
           </a:p>
         </p:txBody>
@@ -5959,7 +6056,7 @@
           <p:cNvPr id="5" name="Content Placeholder 4">
             <a:extLst>
               <a:ext uri="{FF2B5EF4-FFF2-40B4-BE49-F238E27FC236}">
-                <a16:creationId xmlns:a16="http://schemas.microsoft.com/office/drawing/2014/main" id="{412FF37C-39D8-4B82-9C13-211AF51D32D8}"/>
+                <a16:creationId xmlns:a16="http://schemas.microsoft.com/office/drawing/2014/main" id="{12C92E96-58CF-4829-B8DE-7122496FE5D0}"/>
               </a:ext>
             </a:extLst>
           </p:cNvPr>
@@ -5978,84 +6075,15 @@
         </p:blipFill>
         <p:spPr>
           <a:xfrm>
-            <a:off x="702786" y="1574358"/>
-            <a:ext cx="7928231" cy="3447359"/>
+            <a:off x="3578087" y="452595"/>
+            <a:ext cx="7464497" cy="5952809"/>
           </a:xfrm>
         </p:spPr>
       </p:pic>
-      <p:sp>
-        <p:nvSpPr>
-          <p:cNvPr id="7" name="TextBox 6">
-            <a:extLst>
-              <a:ext uri="{FF2B5EF4-FFF2-40B4-BE49-F238E27FC236}">
-                <a16:creationId xmlns:a16="http://schemas.microsoft.com/office/drawing/2014/main" id="{60B3A371-5241-4DC6-B719-A4620EEC531C}"/>
-              </a:ext>
-            </a:extLst>
-          </p:cNvPr>
-          <p:cNvSpPr txBox="1"/>
-          <p:nvPr/>
-        </p:nvSpPr>
-        <p:spPr>
-          <a:xfrm>
-            <a:off x="8765399" y="1899025"/>
-            <a:ext cx="2603883" cy="2862322"/>
-          </a:xfrm>
-          <a:prstGeom prst="rect">
-            <a:avLst/>
-          </a:prstGeom>
-          <a:noFill/>
-        </p:spPr>
-        <p:txBody>
-          <a:bodyPr wrap="square">
-            <a:spAutoFit/>
-          </a:bodyPr>
-          <a:lstStyle/>
-          <a:p>
-            <a:pPr marL="285750" indent="-285750">
-              <a:buFont typeface="Arial" panose="020B0604020202020204" pitchFamily="34" charset="0"/>
-              <a:buChar char="•"/>
-            </a:pPr>
-            <a:r>
-              <a:rPr lang="en-US" dirty="0"/>
-              <a:t>Unimodal distribution</a:t>
-            </a:r>
-          </a:p>
-          <a:p>
-            <a:pPr marL="285750" indent="-285750">
-              <a:buFont typeface="Arial" panose="020B0604020202020204" pitchFamily="34" charset="0"/>
-              <a:buChar char="•"/>
-            </a:pPr>
-            <a:r>
-              <a:rPr lang="en-US" dirty="0"/>
-              <a:t>Most common value about 67 inches</a:t>
-            </a:r>
-          </a:p>
-          <a:p>
-            <a:pPr marL="285750" indent="-285750">
-              <a:buFont typeface="Arial" panose="020B0604020202020204" pitchFamily="34" charset="0"/>
-              <a:buChar char="•"/>
-            </a:pPr>
-            <a:r>
-              <a:rPr lang="en-US" dirty="0"/>
-              <a:t>The middle 50% of individuals are between 5.5 feet and just under 6 feet tall </a:t>
-            </a:r>
-          </a:p>
-          <a:p>
-            <a:pPr marL="285750" indent="-285750">
-              <a:buFont typeface="Arial" panose="020B0604020202020204" pitchFamily="34" charset="0"/>
-              <a:buChar char="•"/>
-            </a:pPr>
-            <a:r>
-              <a:rPr lang="en-US" dirty="0"/>
-              <a:t>There are 2 outliers of one unusually tall and short person each</a:t>
-            </a:r>
-          </a:p>
-        </p:txBody>
-      </p:sp>
     </p:spTree>
     <p:extLst>
       <p:ext uri="{BB962C8B-B14F-4D97-AF65-F5344CB8AC3E}">
-        <p14:creationId xmlns:p14="http://schemas.microsoft.com/office/powerpoint/2010/main" val="3017378467"/>
+        <p14:creationId xmlns:p14="http://schemas.microsoft.com/office/powerpoint/2010/main" val="2786594713"/>
       </p:ext>
     </p:extLst>
   </p:cSld>
@@ -6087,7 +6115,7 @@
           <p:cNvPr id="2" name="Title 1">
             <a:extLst>
               <a:ext uri="{FF2B5EF4-FFF2-40B4-BE49-F238E27FC236}">
-                <a16:creationId xmlns:a16="http://schemas.microsoft.com/office/drawing/2014/main" id="{4448C6B8-07E2-4D06-9B6F-86528FDA68B3}"/>
+                <a16:creationId xmlns:a16="http://schemas.microsoft.com/office/drawing/2014/main" id="{A29184D8-C6A4-44BE-A09F-2BF0E95CEDA9}"/>
               </a:ext>
             </a:extLst>
           </p:cNvPr>
@@ -6105,40 +6133,113 @@
           <a:p>
             <a:r>
               <a:rPr lang="en-US" dirty="0"/>
-              <a:t>Associations between variables</a:t>
-            </a:r>
-          </a:p>
-        </p:txBody>
-      </p:sp>
-      <p:sp>
-        <p:nvSpPr>
-          <p:cNvPr id="3" name="Text Placeholder 2">
-            <a:extLst>
-              <a:ext uri="{FF2B5EF4-FFF2-40B4-BE49-F238E27FC236}">
-                <a16:creationId xmlns:a16="http://schemas.microsoft.com/office/drawing/2014/main" id="{9476BE8B-D5C1-4D77-93F1-275BDD9C2806}"/>
-              </a:ext>
-            </a:extLst>
-          </p:cNvPr>
-          <p:cNvSpPr>
-            <a:spLocks noGrp="1"/>
-          </p:cNvSpPr>
-          <p:nvPr>
-            <p:ph type="body" idx="1"/>
-          </p:nvPr>
-        </p:nvSpPr>
-        <p:spPr/>
-        <p:txBody>
-          <a:bodyPr/>
-          <a:lstStyle/>
-          <a:p>
-            <a:endParaRPr lang="en-US"/>
+              <a:t>Histograms and boxplots</a:t>
+            </a:r>
+          </a:p>
+        </p:txBody>
+      </p:sp>
+      <p:pic>
+        <p:nvPicPr>
+          <p:cNvPr id="5" name="Content Placeholder 4">
+            <a:extLst>
+              <a:ext uri="{FF2B5EF4-FFF2-40B4-BE49-F238E27FC236}">
+                <a16:creationId xmlns:a16="http://schemas.microsoft.com/office/drawing/2014/main" id="{412FF37C-39D8-4B82-9C13-211AF51D32D8}"/>
+              </a:ext>
+            </a:extLst>
+          </p:cNvPr>
+          <p:cNvPicPr>
+            <a:picLocks noGrp="1" noChangeAspect="1"/>
+          </p:cNvPicPr>
+          <p:nvPr>
+            <p:ph idx="1"/>
+          </p:nvPr>
+        </p:nvPicPr>
+        <p:blipFill>
+          <a:blip r:embed="rId2"/>
+          <a:stretch>
+            <a:fillRect/>
+          </a:stretch>
+        </p:blipFill>
+        <p:spPr>
+          <a:xfrm>
+            <a:off x="702786" y="1574358"/>
+            <a:ext cx="7928231" cy="3447359"/>
+          </a:xfrm>
+        </p:spPr>
+      </p:pic>
+      <p:sp>
+        <p:nvSpPr>
+          <p:cNvPr id="7" name="TextBox 6">
+            <a:extLst>
+              <a:ext uri="{FF2B5EF4-FFF2-40B4-BE49-F238E27FC236}">
+                <a16:creationId xmlns:a16="http://schemas.microsoft.com/office/drawing/2014/main" id="{60B3A371-5241-4DC6-B719-A4620EEC531C}"/>
+              </a:ext>
+            </a:extLst>
+          </p:cNvPr>
+          <p:cNvSpPr txBox="1"/>
+          <p:nvPr/>
+        </p:nvSpPr>
+        <p:spPr>
+          <a:xfrm>
+            <a:off x="8765399" y="1899025"/>
+            <a:ext cx="2603883" cy="2862322"/>
+          </a:xfrm>
+          <a:prstGeom prst="rect">
+            <a:avLst/>
+          </a:prstGeom>
+          <a:noFill/>
+        </p:spPr>
+        <p:txBody>
+          <a:bodyPr wrap="square">
+            <a:spAutoFit/>
+          </a:bodyPr>
+          <a:lstStyle/>
+          <a:p>
+            <a:pPr marL="285750" indent="-285750">
+              <a:buFont typeface="Arial" panose="020B0604020202020204" pitchFamily="34" charset="0"/>
+              <a:buChar char="•"/>
+            </a:pPr>
+            <a:r>
+              <a:rPr lang="en-US" dirty="0"/>
+              <a:t>Unimodal distribution</a:t>
+            </a:r>
+          </a:p>
+          <a:p>
+            <a:pPr marL="285750" indent="-285750">
+              <a:buFont typeface="Arial" panose="020B0604020202020204" pitchFamily="34" charset="0"/>
+              <a:buChar char="•"/>
+            </a:pPr>
+            <a:r>
+              <a:rPr lang="en-US" dirty="0"/>
+              <a:t>Most common value about 67 inches</a:t>
+            </a:r>
+          </a:p>
+          <a:p>
+            <a:pPr marL="285750" indent="-285750">
+              <a:buFont typeface="Arial" panose="020B0604020202020204" pitchFamily="34" charset="0"/>
+              <a:buChar char="•"/>
+            </a:pPr>
+            <a:r>
+              <a:rPr lang="en-US" dirty="0"/>
+              <a:t>The middle 50% of individuals are between 5.5 feet and just under 6 feet tall </a:t>
+            </a:r>
+          </a:p>
+          <a:p>
+            <a:pPr marL="285750" indent="-285750">
+              <a:buFont typeface="Arial" panose="020B0604020202020204" pitchFamily="34" charset="0"/>
+              <a:buChar char="•"/>
+            </a:pPr>
+            <a:r>
+              <a:rPr lang="en-US" dirty="0"/>
+              <a:t>There are 2 outliers of one unusually tall and short person each</a:t>
+            </a:r>
           </a:p>
         </p:txBody>
       </p:sp>
     </p:spTree>
     <p:extLst>
       <p:ext uri="{BB962C8B-B14F-4D97-AF65-F5344CB8AC3E}">
-        <p14:creationId xmlns:p14="http://schemas.microsoft.com/office/powerpoint/2010/main" val="1042363831"/>
+        <p14:creationId xmlns:p14="http://schemas.microsoft.com/office/powerpoint/2010/main" val="3017378467"/>
       </p:ext>
     </p:extLst>
   </p:cSld>
@@ -6170,7 +6271,7 @@
           <p:cNvPr id="2" name="Title 1">
             <a:extLst>
               <a:ext uri="{FF2B5EF4-FFF2-40B4-BE49-F238E27FC236}">
-                <a16:creationId xmlns:a16="http://schemas.microsoft.com/office/drawing/2014/main" id="{C5C9F9EA-3CF6-45BC-9415-6E273A58C2BA}"/>
+                <a16:creationId xmlns:a16="http://schemas.microsoft.com/office/drawing/2014/main" id="{4448C6B8-07E2-4D06-9B6F-86528FDA68B3}"/>
               </a:ext>
             </a:extLst>
           </p:cNvPr>
@@ -6187,81 +6288,41 @@
           <a:lstStyle/>
           <a:p>
             <a:r>
-              <a:rPr lang="en-US"/>
-              <a:t>Scatterplots</a:t>
-            </a:r>
-            <a:endParaRPr lang="en-US" dirty="0"/>
-          </a:p>
-        </p:txBody>
-      </p:sp>
-      <p:pic>
-        <p:nvPicPr>
-          <p:cNvPr id="5" name="Content Placeholder 4">
-            <a:extLst>
-              <a:ext uri="{FF2B5EF4-FFF2-40B4-BE49-F238E27FC236}">
-                <a16:creationId xmlns:a16="http://schemas.microsoft.com/office/drawing/2014/main" id="{F141D8CE-9DE6-442B-9FC1-E288E976D5E1}"/>
-              </a:ext>
-            </a:extLst>
-          </p:cNvPr>
-          <p:cNvPicPr>
-            <a:picLocks noGrp="1" noChangeAspect="1"/>
-          </p:cNvPicPr>
-          <p:nvPr>
-            <p:ph idx="1"/>
-          </p:nvPr>
-        </p:nvPicPr>
-        <p:blipFill>
-          <a:blip r:embed="rId2"/>
-          <a:stretch>
-            <a:fillRect/>
-          </a:stretch>
-        </p:blipFill>
-        <p:spPr>
-          <a:xfrm>
-            <a:off x="715607" y="1499622"/>
-            <a:ext cx="7850607" cy="4351338"/>
-          </a:xfrm>
-        </p:spPr>
-      </p:pic>
-      <p:sp>
-        <p:nvSpPr>
-          <p:cNvPr id="6" name="TextBox 5">
-            <a:extLst>
-              <a:ext uri="{FF2B5EF4-FFF2-40B4-BE49-F238E27FC236}">
-                <a16:creationId xmlns:a16="http://schemas.microsoft.com/office/drawing/2014/main" id="{F64A741D-3B53-45A9-B3FC-A21C2A97BEF5}"/>
-              </a:ext>
-            </a:extLst>
-          </p:cNvPr>
-          <p:cNvSpPr txBox="1"/>
-          <p:nvPr/>
-        </p:nvSpPr>
-        <p:spPr>
-          <a:xfrm>
-            <a:off x="8431042" y="1658882"/>
-            <a:ext cx="3146057" cy="1631216"/>
-          </a:xfrm>
-          <a:prstGeom prst="rect">
-            <a:avLst/>
-          </a:prstGeom>
-          <a:noFill/>
-        </p:spPr>
-        <p:txBody>
-          <a:bodyPr wrap="square" rtlCol="0">
-            <a:spAutoFit/>
-          </a:bodyPr>
-          <a:lstStyle/>
-          <a:p>
-            <a:r>
-              <a:rPr lang="en-US" sz="2000" dirty="0"/>
-              <a:t>Can be used to check whether two variables are independent or positively / negatively associated with each other. </a:t>
-            </a:r>
+              <a:rPr lang="en-US" dirty="0"/>
+              <a:t>Associations between variables</a:t>
+            </a:r>
+          </a:p>
+        </p:txBody>
+      </p:sp>
+      <p:sp>
+        <p:nvSpPr>
+          <p:cNvPr id="3" name="Text Placeholder 2">
+            <a:extLst>
+              <a:ext uri="{FF2B5EF4-FFF2-40B4-BE49-F238E27FC236}">
+                <a16:creationId xmlns:a16="http://schemas.microsoft.com/office/drawing/2014/main" id="{9476BE8B-D5C1-4D77-93F1-275BDD9C2806}"/>
+              </a:ext>
+            </a:extLst>
+          </p:cNvPr>
+          <p:cNvSpPr>
+            <a:spLocks noGrp="1"/>
+          </p:cNvSpPr>
+          <p:nvPr>
+            <p:ph type="body" idx="1"/>
+          </p:nvPr>
+        </p:nvSpPr>
+        <p:spPr/>
+        <p:txBody>
+          <a:bodyPr/>
+          <a:lstStyle/>
+          <a:p>
+            <a:endParaRPr lang="en-US"/>
           </a:p>
         </p:txBody>
       </p:sp>
     </p:spTree>
     <p:extLst>
       <p:ext uri="{BB962C8B-B14F-4D97-AF65-F5344CB8AC3E}">
-        <p14:creationId xmlns:p14="http://schemas.microsoft.com/office/powerpoint/2010/main" val="1889522145"/>
+        <p14:creationId xmlns:p14="http://schemas.microsoft.com/office/powerpoint/2010/main" val="1042363831"/>
       </p:ext>
     </p:extLst>
   </p:cSld>
@@ -6394,7 +6455,7 @@
           <p:cNvPr id="2" name="Title 1">
             <a:extLst>
               <a:ext uri="{FF2B5EF4-FFF2-40B4-BE49-F238E27FC236}">
-                <a16:creationId xmlns:a16="http://schemas.microsoft.com/office/drawing/2014/main" id="{697744CE-AAF9-40E8-9FFC-6230E7171388}"/>
+                <a16:creationId xmlns:a16="http://schemas.microsoft.com/office/drawing/2014/main" id="{C5C9F9EA-3CF6-45BC-9415-6E273A58C2BA}"/>
               </a:ext>
             </a:extLst>
           </p:cNvPr>
@@ -6411,9 +6472,10 @@
           <a:lstStyle/>
           <a:p>
             <a:r>
-              <a:rPr lang="en-US" dirty="0"/>
-              <a:t>Correlations</a:t>
-            </a:r>
+              <a:rPr lang="en-US"/>
+              <a:t>Scatterplots</a:t>
+            </a:r>
+            <a:endParaRPr lang="en-US" dirty="0"/>
           </a:p>
         </p:txBody>
       </p:sp>
@@ -6422,7 +6484,7 @@
           <p:cNvPr id="5" name="Content Placeholder 4">
             <a:extLst>
               <a:ext uri="{FF2B5EF4-FFF2-40B4-BE49-F238E27FC236}">
-                <a16:creationId xmlns:a16="http://schemas.microsoft.com/office/drawing/2014/main" id="{742F14B2-734C-422D-8DEA-1C4CABB46DA5}"/>
+                <a16:creationId xmlns:a16="http://schemas.microsoft.com/office/drawing/2014/main" id="{F141D8CE-9DE6-442B-9FC1-E288E976D5E1}"/>
               </a:ext>
             </a:extLst>
           </p:cNvPr>
@@ -6441,8 +6503,8 @@
         </p:blipFill>
         <p:spPr>
           <a:xfrm>
-            <a:off x="779817" y="1690688"/>
-            <a:ext cx="7229207" cy="4351338"/>
+            <a:off x="715607" y="1499622"/>
+            <a:ext cx="7850607" cy="4351338"/>
           </a:xfrm>
         </p:spPr>
       </p:pic>
@@ -6451,7 +6513,7 @@
           <p:cNvPr id="6" name="TextBox 5">
             <a:extLst>
               <a:ext uri="{FF2B5EF4-FFF2-40B4-BE49-F238E27FC236}">
-                <a16:creationId xmlns:a16="http://schemas.microsoft.com/office/drawing/2014/main" id="{D34F1982-4A34-4D4A-926B-64914BAD42FD}"/>
+                <a16:creationId xmlns:a16="http://schemas.microsoft.com/office/drawing/2014/main" id="{F64A741D-3B53-45A9-B3FC-A21C2A97BEF5}"/>
               </a:ext>
             </a:extLst>
           </p:cNvPr>
@@ -6460,8 +6522,8 @@
         </p:nvSpPr>
         <p:spPr>
           <a:xfrm>
-            <a:off x="8158737" y="1773141"/>
-            <a:ext cx="3045349" cy="3170099"/>
+            <a:off x="8431042" y="1658882"/>
+            <a:ext cx="3146057" cy="1631216"/>
           </a:xfrm>
           <a:prstGeom prst="rect">
             <a:avLst/>
@@ -6476,25 +6538,7 @@
           <a:p>
             <a:r>
               <a:rPr lang="en-US" sz="2000" dirty="0"/>
-              <a:t>Correlations assess the strength of a relationship between two variables. </a:t>
-            </a:r>
-          </a:p>
-          <a:p>
-            <a:endParaRPr lang="en-US" sz="2000" dirty="0"/>
-          </a:p>
-          <a:p>
-            <a:r>
-              <a:rPr lang="en-US" sz="2000" dirty="0"/>
-              <a:t>Correlation coefficients range from -1 to 1. </a:t>
-            </a:r>
-          </a:p>
-          <a:p>
-            <a:endParaRPr lang="en-US" sz="2000" dirty="0"/>
-          </a:p>
-          <a:p>
-            <a:r>
-              <a:rPr lang="en-US" sz="2000" b="1" dirty="0"/>
-              <a:t>Correlations are only meaningful for linear relationships! </a:t>
+              <a:t>Can be used to check whether two variables are independent or positively / negatively associated with each other. </a:t>
             </a:r>
           </a:p>
         </p:txBody>
@@ -6502,7 +6546,7 @@
     </p:spTree>
     <p:extLst>
       <p:ext uri="{BB962C8B-B14F-4D97-AF65-F5344CB8AC3E}">
-        <p14:creationId xmlns:p14="http://schemas.microsoft.com/office/powerpoint/2010/main" val="1402110234"/>
+        <p14:creationId xmlns:p14="http://schemas.microsoft.com/office/powerpoint/2010/main" val="1889522145"/>
       </p:ext>
     </p:extLst>
   </p:cSld>
@@ -6534,7 +6578,7 @@
           <p:cNvPr id="2" name="Title 1">
             <a:extLst>
               <a:ext uri="{FF2B5EF4-FFF2-40B4-BE49-F238E27FC236}">
-                <a16:creationId xmlns:a16="http://schemas.microsoft.com/office/drawing/2014/main" id="{E4F526B6-1F86-42F8-AE04-B3A024C721A0}"/>
+                <a16:creationId xmlns:a16="http://schemas.microsoft.com/office/drawing/2014/main" id="{697744CE-AAF9-40E8-9FFC-6230E7171388}"/>
               </a:ext>
             </a:extLst>
           </p:cNvPr>
@@ -6552,7 +6596,7 @@
           <a:p>
             <a:r>
               <a:rPr lang="en-US" dirty="0"/>
-              <a:t>Correlation is NOT causation</a:t>
+              <a:t>Correlations</a:t>
             </a:r>
           </a:p>
         </p:txBody>
@@ -6562,7 +6606,7 @@
           <p:cNvPr id="5" name="Content Placeholder 4">
             <a:extLst>
               <a:ext uri="{FF2B5EF4-FFF2-40B4-BE49-F238E27FC236}">
-                <a16:creationId xmlns:a16="http://schemas.microsoft.com/office/drawing/2014/main" id="{8364155C-D0CA-4FCC-8518-7751EB6E26F3}"/>
+                <a16:creationId xmlns:a16="http://schemas.microsoft.com/office/drawing/2014/main" id="{742F14B2-734C-422D-8DEA-1C4CABB46DA5}"/>
               </a:ext>
             </a:extLst>
           </p:cNvPr>
@@ -6581,15 +6625,68 @@
         </p:blipFill>
         <p:spPr>
           <a:xfrm>
-            <a:off x="1659123" y="1825625"/>
-            <a:ext cx="8873754" cy="4351338"/>
+            <a:off x="779817" y="1690688"/>
+            <a:ext cx="7229207" cy="4351338"/>
           </a:xfrm>
         </p:spPr>
       </p:pic>
+      <p:sp>
+        <p:nvSpPr>
+          <p:cNvPr id="6" name="TextBox 5">
+            <a:extLst>
+              <a:ext uri="{FF2B5EF4-FFF2-40B4-BE49-F238E27FC236}">
+                <a16:creationId xmlns:a16="http://schemas.microsoft.com/office/drawing/2014/main" id="{D34F1982-4A34-4D4A-926B-64914BAD42FD}"/>
+              </a:ext>
+            </a:extLst>
+          </p:cNvPr>
+          <p:cNvSpPr txBox="1"/>
+          <p:nvPr/>
+        </p:nvSpPr>
+        <p:spPr>
+          <a:xfrm>
+            <a:off x="8158737" y="1773141"/>
+            <a:ext cx="3045349" cy="3170099"/>
+          </a:xfrm>
+          <a:prstGeom prst="rect">
+            <a:avLst/>
+          </a:prstGeom>
+          <a:noFill/>
+        </p:spPr>
+        <p:txBody>
+          <a:bodyPr wrap="square" rtlCol="0">
+            <a:spAutoFit/>
+          </a:bodyPr>
+          <a:lstStyle/>
+          <a:p>
+            <a:r>
+              <a:rPr lang="en-US" sz="2000" dirty="0"/>
+              <a:t>Correlations assess the strength of a relationship between two variables. </a:t>
+            </a:r>
+          </a:p>
+          <a:p>
+            <a:endParaRPr lang="en-US" sz="2000" dirty="0"/>
+          </a:p>
+          <a:p>
+            <a:r>
+              <a:rPr lang="en-US" sz="2000" dirty="0"/>
+              <a:t>Correlation coefficients range from -1 to 1. </a:t>
+            </a:r>
+          </a:p>
+          <a:p>
+            <a:endParaRPr lang="en-US" sz="2000" dirty="0"/>
+          </a:p>
+          <a:p>
+            <a:r>
+              <a:rPr lang="en-US" sz="2000" b="1" dirty="0"/>
+              <a:t>Correlations are only meaningful for linear relationships! </a:t>
+            </a:r>
+          </a:p>
+        </p:txBody>
+      </p:sp>
     </p:spTree>
     <p:extLst>
       <p:ext uri="{BB962C8B-B14F-4D97-AF65-F5344CB8AC3E}">
-        <p14:creationId xmlns:p14="http://schemas.microsoft.com/office/powerpoint/2010/main" val="1307873992"/>
+        <p14:creationId xmlns:p14="http://schemas.microsoft.com/office/powerpoint/2010/main" val="1402110234"/>
       </p:ext>
     </p:extLst>
   </p:cSld>
@@ -6638,19 +6735,18 @@
           <a:lstStyle/>
           <a:p>
             <a:r>
-              <a:rPr lang="en-US"/>
+              <a:rPr lang="en-US" dirty="0"/>
               <a:t>Correlation is NOT causation</a:t>
             </a:r>
-            <a:endParaRPr lang="en-US" dirty="0"/>
           </a:p>
         </p:txBody>
       </p:sp>
       <p:pic>
         <p:nvPicPr>
-          <p:cNvPr id="7" name="Content Placeholder 6">
-            <a:extLst>
-              <a:ext uri="{FF2B5EF4-FFF2-40B4-BE49-F238E27FC236}">
-                <a16:creationId xmlns:a16="http://schemas.microsoft.com/office/drawing/2014/main" id="{819D9306-5561-47C6-9AB3-00A8ABBE2F11}"/>
+          <p:cNvPr id="5" name="Content Placeholder 4">
+            <a:extLst>
+              <a:ext uri="{FF2B5EF4-FFF2-40B4-BE49-F238E27FC236}">
+                <a16:creationId xmlns:a16="http://schemas.microsoft.com/office/drawing/2014/main" id="{8364155C-D0CA-4FCC-8518-7751EB6E26F3}"/>
               </a:ext>
             </a:extLst>
           </p:cNvPr>
@@ -6669,15 +6765,15 @@
         </p:blipFill>
         <p:spPr>
           <a:xfrm>
-            <a:off x="1678060" y="1825625"/>
-            <a:ext cx="8835880" cy="4351338"/>
+            <a:off x="1659123" y="1825625"/>
+            <a:ext cx="8873754" cy="4351338"/>
           </a:xfrm>
         </p:spPr>
       </p:pic>
     </p:spTree>
     <p:extLst>
       <p:ext uri="{BB962C8B-B14F-4D97-AF65-F5344CB8AC3E}">
-        <p14:creationId xmlns:p14="http://schemas.microsoft.com/office/powerpoint/2010/main" val="687646025"/>
+        <p14:creationId xmlns:p14="http://schemas.microsoft.com/office/powerpoint/2010/main" val="1307873992"/>
       </p:ext>
     </p:extLst>
   </p:cSld>
@@ -6709,7 +6805,7 @@
           <p:cNvPr id="2" name="Title 1">
             <a:extLst>
               <a:ext uri="{FF2B5EF4-FFF2-40B4-BE49-F238E27FC236}">
-                <a16:creationId xmlns:a16="http://schemas.microsoft.com/office/drawing/2014/main" id="{2C7C4E9C-D15A-4D8C-A5FF-132B39A86F6B}"/>
+                <a16:creationId xmlns:a16="http://schemas.microsoft.com/office/drawing/2014/main" id="{E4F526B6-1F86-42F8-AE04-B3A024C721A0}"/>
               </a:ext>
             </a:extLst>
           </p:cNvPr>
@@ -6726,18 +6822,19 @@
           <a:lstStyle/>
           <a:p>
             <a:r>
-              <a:rPr lang="en-US" dirty="0"/>
-              <a:t>Ecological fallacy</a:t>
-            </a:r>
+              <a:rPr lang="en-US"/>
+              <a:t>Correlation is NOT causation</a:t>
+            </a:r>
+            <a:endParaRPr lang="en-US" dirty="0"/>
           </a:p>
         </p:txBody>
       </p:sp>
       <p:pic>
         <p:nvPicPr>
-          <p:cNvPr id="4" name="Content Placeholder 3">
-            <a:extLst>
-              <a:ext uri="{FF2B5EF4-FFF2-40B4-BE49-F238E27FC236}">
-                <a16:creationId xmlns:a16="http://schemas.microsoft.com/office/drawing/2014/main" id="{19453110-ACD3-40D7-969A-22A9ACC00A8C}"/>
+          <p:cNvPr id="7" name="Content Placeholder 6">
+            <a:extLst>
+              <a:ext uri="{FF2B5EF4-FFF2-40B4-BE49-F238E27FC236}">
+                <a16:creationId xmlns:a16="http://schemas.microsoft.com/office/drawing/2014/main" id="{819D9306-5561-47C6-9AB3-00A8ABBE2F11}"/>
               </a:ext>
             </a:extLst>
           </p:cNvPr>
@@ -6756,122 +6853,15 @@
         </p:blipFill>
         <p:spPr>
           <a:xfrm>
-            <a:off x="838200" y="1690688"/>
-            <a:ext cx="7050269" cy="4351338"/>
-          </a:xfrm>
-          <a:prstGeom prst="rect">
-            <a:avLst/>
-          </a:prstGeom>
+            <a:off x="1678060" y="1825625"/>
+            <a:ext cx="8835880" cy="4351338"/>
+          </a:xfrm>
         </p:spPr>
       </p:pic>
-      <p:pic>
-        <p:nvPicPr>
-          <p:cNvPr id="5" name="Picture 4">
-            <a:extLst>
-              <a:ext uri="{FF2B5EF4-FFF2-40B4-BE49-F238E27FC236}">
-                <a16:creationId xmlns:a16="http://schemas.microsoft.com/office/drawing/2014/main" id="{E3F6E32E-B36D-430E-9058-62492846C682}"/>
-              </a:ext>
-            </a:extLst>
-          </p:cNvPr>
-          <p:cNvPicPr>
-            <a:picLocks noChangeAspect="1"/>
-          </p:cNvPicPr>
-          <p:nvPr/>
-        </p:nvPicPr>
-        <p:blipFill>
-          <a:blip r:embed="rId3"/>
-          <a:stretch>
-            <a:fillRect/>
-          </a:stretch>
-        </p:blipFill>
-        <p:spPr>
-          <a:xfrm>
-            <a:off x="8271852" y="2241786"/>
-            <a:ext cx="1866900" cy="771525"/>
-          </a:xfrm>
-          <a:prstGeom prst="rect">
-            <a:avLst/>
-          </a:prstGeom>
-        </p:spPr>
-      </p:pic>
-      <p:sp>
-        <p:nvSpPr>
-          <p:cNvPr id="6" name="TextBox 5">
-            <a:extLst>
-              <a:ext uri="{FF2B5EF4-FFF2-40B4-BE49-F238E27FC236}">
-                <a16:creationId xmlns:a16="http://schemas.microsoft.com/office/drawing/2014/main" id="{0D9BB1FD-B8AA-4AE6-AF41-B0A33E3A9380}"/>
-              </a:ext>
-            </a:extLst>
-          </p:cNvPr>
-          <p:cNvSpPr txBox="1"/>
-          <p:nvPr/>
-        </p:nvSpPr>
-        <p:spPr>
-          <a:xfrm>
-            <a:off x="8271852" y="1687748"/>
-            <a:ext cx="2401294" cy="646331"/>
-          </a:xfrm>
-          <a:prstGeom prst="rect">
-            <a:avLst/>
-          </a:prstGeom>
-          <a:noFill/>
-        </p:spPr>
-        <p:txBody>
-          <a:bodyPr wrap="square" rtlCol="0">
-            <a:spAutoFit/>
-          </a:bodyPr>
-          <a:lstStyle/>
-          <a:p>
-            <a:r>
-              <a:rPr lang="en-US" dirty="0"/>
-              <a:t>Infant survival is calculated as log-odds. </a:t>
-            </a:r>
-          </a:p>
-        </p:txBody>
-      </p:sp>
-      <p:sp>
-        <p:nvSpPr>
-          <p:cNvPr id="7" name="TextBox 6">
-            <a:extLst>
-              <a:ext uri="{FF2B5EF4-FFF2-40B4-BE49-F238E27FC236}">
-                <a16:creationId xmlns:a16="http://schemas.microsoft.com/office/drawing/2014/main" id="{6A3A2F1D-2DF7-41B2-B9B8-662B69EBFE07}"/>
-              </a:ext>
-            </a:extLst>
-          </p:cNvPr>
-          <p:cNvSpPr txBox="1"/>
-          <p:nvPr/>
-        </p:nvSpPr>
-        <p:spPr>
-          <a:xfrm>
-            <a:off x="8271852" y="4031311"/>
-            <a:ext cx="2568271" cy="1477328"/>
-          </a:xfrm>
-          <a:prstGeom prst="rect">
-            <a:avLst/>
-          </a:prstGeom>
-          <a:noFill/>
-        </p:spPr>
-        <p:txBody>
-          <a:bodyPr wrap="square" rtlCol="0">
-            <a:spAutoFit/>
-          </a:bodyPr>
-          <a:lstStyle/>
-          <a:p>
-            <a:r>
-              <a:rPr lang="en-US" dirty="0">
-                <a:solidFill>
-                  <a:schemeClr val="accent1"/>
-                </a:solidFill>
-              </a:rPr>
-              <a:t>There seems to be an almost perfect correlation between income and infant survival odds. </a:t>
-            </a:r>
-          </a:p>
-        </p:txBody>
-      </p:sp>
     </p:spTree>
     <p:extLst>
       <p:ext uri="{BB962C8B-B14F-4D97-AF65-F5344CB8AC3E}">
-        <p14:creationId xmlns:p14="http://schemas.microsoft.com/office/powerpoint/2010/main" val="1861948448"/>
+        <p14:creationId xmlns:p14="http://schemas.microsoft.com/office/powerpoint/2010/main" val="687646025"/>
       </p:ext>
     </p:extLst>
   </p:cSld>
@@ -6928,10 +6918,10 @@
       </p:sp>
       <p:pic>
         <p:nvPicPr>
-          <p:cNvPr id="6" name="Content Placeholder 5">
-            <a:extLst>
-              <a:ext uri="{FF2B5EF4-FFF2-40B4-BE49-F238E27FC236}">
-                <a16:creationId xmlns:a16="http://schemas.microsoft.com/office/drawing/2014/main" id="{521AAAEA-D173-460B-B383-183A8D8AA505}"/>
+          <p:cNvPr id="4" name="Content Placeholder 3">
+            <a:extLst>
+              <a:ext uri="{FF2B5EF4-FFF2-40B4-BE49-F238E27FC236}">
+                <a16:creationId xmlns:a16="http://schemas.microsoft.com/office/drawing/2014/main" id="{19453110-ACD3-40D7-969A-22A9ACC00A8C}"/>
               </a:ext>
             </a:extLst>
           </p:cNvPr>
@@ -6950,7 +6940,7 @@
         </p:blipFill>
         <p:spPr>
           <a:xfrm>
-            <a:off x="838200" y="1817673"/>
+            <a:off x="838200" y="1690688"/>
             <a:ext cx="7050269" cy="4351338"/>
           </a:xfrm>
           <a:prstGeom prst="rect">
@@ -6958,12 +6948,42 @@
           </a:prstGeom>
         </p:spPr>
       </p:pic>
-      <p:sp>
-        <p:nvSpPr>
-          <p:cNvPr id="4" name="TextBox 3">
-            <a:extLst>
-              <a:ext uri="{FF2B5EF4-FFF2-40B4-BE49-F238E27FC236}">
-                <a16:creationId xmlns:a16="http://schemas.microsoft.com/office/drawing/2014/main" id="{CB0A4E36-A985-498F-A557-54DA8EADB7F5}"/>
+      <p:pic>
+        <p:nvPicPr>
+          <p:cNvPr id="5" name="Picture 4">
+            <a:extLst>
+              <a:ext uri="{FF2B5EF4-FFF2-40B4-BE49-F238E27FC236}">
+                <a16:creationId xmlns:a16="http://schemas.microsoft.com/office/drawing/2014/main" id="{E3F6E32E-B36D-430E-9058-62492846C682}"/>
+              </a:ext>
+            </a:extLst>
+          </p:cNvPr>
+          <p:cNvPicPr>
+            <a:picLocks noChangeAspect="1"/>
+          </p:cNvPicPr>
+          <p:nvPr/>
+        </p:nvPicPr>
+        <p:blipFill>
+          <a:blip r:embed="rId3"/>
+          <a:stretch>
+            <a:fillRect/>
+          </a:stretch>
+        </p:blipFill>
+        <p:spPr>
+          <a:xfrm>
+            <a:off x="8271852" y="2241786"/>
+            <a:ext cx="1866900" cy="771525"/>
+          </a:xfrm>
+          <a:prstGeom prst="rect">
+            <a:avLst/>
+          </a:prstGeom>
+        </p:spPr>
+      </p:pic>
+      <p:sp>
+        <p:nvSpPr>
+          <p:cNvPr id="6" name="TextBox 5">
+            <a:extLst>
+              <a:ext uri="{FF2B5EF4-FFF2-40B4-BE49-F238E27FC236}">
+                <a16:creationId xmlns:a16="http://schemas.microsoft.com/office/drawing/2014/main" id="{0D9BB1FD-B8AA-4AE6-AF41-B0A33E3A9380}"/>
               </a:ext>
             </a:extLst>
           </p:cNvPr>
@@ -6972,8 +6992,43 @@
         </p:nvSpPr>
         <p:spPr>
           <a:xfrm>
-            <a:off x="8073069" y="1817673"/>
-            <a:ext cx="2568271" cy="1754326"/>
+            <a:off x="8271852" y="1687748"/>
+            <a:ext cx="2401294" cy="646331"/>
+          </a:xfrm>
+          <a:prstGeom prst="rect">
+            <a:avLst/>
+          </a:prstGeom>
+          <a:noFill/>
+        </p:spPr>
+        <p:txBody>
+          <a:bodyPr wrap="square" rtlCol="0">
+            <a:spAutoFit/>
+          </a:bodyPr>
+          <a:lstStyle/>
+          <a:p>
+            <a:r>
+              <a:rPr lang="en-US" dirty="0"/>
+              <a:t>Infant survival is calculated as log-odds. </a:t>
+            </a:r>
+          </a:p>
+        </p:txBody>
+      </p:sp>
+      <p:sp>
+        <p:nvSpPr>
+          <p:cNvPr id="7" name="TextBox 6">
+            <a:extLst>
+              <a:ext uri="{FF2B5EF4-FFF2-40B4-BE49-F238E27FC236}">
+                <a16:creationId xmlns:a16="http://schemas.microsoft.com/office/drawing/2014/main" id="{6A3A2F1D-2DF7-41B2-B9B8-662B69EBFE07}"/>
+              </a:ext>
+            </a:extLst>
+          </p:cNvPr>
+          <p:cNvSpPr txBox="1"/>
+          <p:nvPr/>
+        </p:nvSpPr>
+        <p:spPr>
+          <a:xfrm>
+            <a:off x="8271852" y="4031311"/>
+            <a:ext cx="2568271" cy="1477328"/>
           </a:xfrm>
           <a:prstGeom prst="rect">
             <a:avLst/>
@@ -6992,7 +7047,7 @@
                   <a:schemeClr val="accent1"/>
                 </a:solidFill>
               </a:rPr>
-              <a:t>BUT: This relationship does not hold within regions. There are likely other factors than income that determine infant survival! </a:t>
+              <a:t>There seems to be an almost perfect correlation between income and infant survival odds. </a:t>
             </a:r>
           </a:p>
         </p:txBody>
@@ -7000,7 +7055,7 @@
     </p:spTree>
     <p:extLst>
       <p:ext uri="{BB962C8B-B14F-4D97-AF65-F5344CB8AC3E}">
-        <p14:creationId xmlns:p14="http://schemas.microsoft.com/office/powerpoint/2010/main" val="191986968"/>
+        <p14:creationId xmlns:p14="http://schemas.microsoft.com/office/powerpoint/2010/main" val="1861948448"/>
       </p:ext>
     </p:extLst>
   </p:cSld>
@@ -7032,7 +7087,7 @@
           <p:cNvPr id="2" name="Title 1">
             <a:extLst>
               <a:ext uri="{FF2B5EF4-FFF2-40B4-BE49-F238E27FC236}">
-                <a16:creationId xmlns:a16="http://schemas.microsoft.com/office/drawing/2014/main" id="{B064281A-FA69-4219-90F7-E7A677B6B065}"/>
+                <a16:creationId xmlns:a16="http://schemas.microsoft.com/office/drawing/2014/main" id="{2C7C4E9C-D15A-4D8C-A5FF-132B39A86F6B}"/>
               </a:ext>
             </a:extLst>
           </p:cNvPr>
@@ -7050,61 +7105,26 @@
           <a:p>
             <a:r>
               <a:rPr lang="en-US" dirty="0"/>
-              <a:t>Contingency tables</a:t>
-            </a:r>
-          </a:p>
-        </p:txBody>
-      </p:sp>
-      <p:sp>
-        <p:nvSpPr>
-          <p:cNvPr id="3" name="Content Placeholder 2">
-            <a:extLst>
-              <a:ext uri="{FF2B5EF4-FFF2-40B4-BE49-F238E27FC236}">
-                <a16:creationId xmlns:a16="http://schemas.microsoft.com/office/drawing/2014/main" id="{A6C83290-FCD6-4A34-8DA9-9929E57C3BE6}"/>
-              </a:ext>
-            </a:extLst>
-          </p:cNvPr>
-          <p:cNvSpPr>
-            <a:spLocks noGrp="1"/>
-          </p:cNvSpPr>
-          <p:nvPr>
-            <p:ph idx="1"/>
-          </p:nvPr>
-        </p:nvSpPr>
-        <p:spPr/>
-        <p:txBody>
-          <a:bodyPr/>
-          <a:lstStyle/>
-          <a:p>
-            <a:r>
-              <a:rPr lang="en-US" dirty="0"/>
-              <a:t>Summarize categorical variables, counting the number of times each combination of values occurs in the data</a:t>
-            </a:r>
-          </a:p>
-          <a:p>
-            <a:r>
-              <a:rPr lang="en-US" dirty="0"/>
-              <a:t>Can be converted into proportions (row or column %)</a:t>
-            </a:r>
-          </a:p>
-          <a:p>
-            <a:endParaRPr lang="en-US" dirty="0"/>
+              <a:t>Ecological fallacy</a:t>
+            </a:r>
           </a:p>
         </p:txBody>
       </p:sp>
       <p:pic>
         <p:nvPicPr>
-          <p:cNvPr id="5" name="Picture 4">
-            <a:extLst>
-              <a:ext uri="{FF2B5EF4-FFF2-40B4-BE49-F238E27FC236}">
-                <a16:creationId xmlns:a16="http://schemas.microsoft.com/office/drawing/2014/main" id="{7C1DA351-5C20-4AA6-9A6D-35241DBC27FC}"/>
+          <p:cNvPr id="6" name="Content Placeholder 5">
+            <a:extLst>
+              <a:ext uri="{FF2B5EF4-FFF2-40B4-BE49-F238E27FC236}">
+                <a16:creationId xmlns:a16="http://schemas.microsoft.com/office/drawing/2014/main" id="{521AAAEA-D173-460B-B383-183A8D8AA505}"/>
               </a:ext>
             </a:extLst>
           </p:cNvPr>
           <p:cNvPicPr>
-            <a:picLocks noChangeAspect="1"/>
+            <a:picLocks noGrp="1" noChangeAspect="1"/>
           </p:cNvPicPr>
-          <p:nvPr/>
+          <p:nvPr>
+            <p:ph idx="1"/>
+          </p:nvPr>
         </p:nvPicPr>
         <p:blipFill>
           <a:blip r:embed="rId2"/>
@@ -7114,48 +7134,57 @@
         </p:blipFill>
         <p:spPr>
           <a:xfrm>
-            <a:off x="733425" y="3369324"/>
-            <a:ext cx="4876800" cy="2400300"/>
+            <a:off x="838200" y="1817673"/>
+            <a:ext cx="7050269" cy="4351338"/>
           </a:xfrm>
           <a:prstGeom prst="rect">
             <a:avLst/>
           </a:prstGeom>
         </p:spPr>
       </p:pic>
-      <p:pic>
-        <p:nvPicPr>
-          <p:cNvPr id="7" name="Picture 6">
-            <a:extLst>
-              <a:ext uri="{FF2B5EF4-FFF2-40B4-BE49-F238E27FC236}">
-                <a16:creationId xmlns:a16="http://schemas.microsoft.com/office/drawing/2014/main" id="{5EADF3BE-DBD9-404A-8031-E44B2338C08B}"/>
-              </a:ext>
-            </a:extLst>
-          </p:cNvPr>
-          <p:cNvPicPr>
-            <a:picLocks noChangeAspect="1"/>
-          </p:cNvPicPr>
+      <p:sp>
+        <p:nvSpPr>
+          <p:cNvPr id="4" name="TextBox 3">
+            <a:extLst>
+              <a:ext uri="{FF2B5EF4-FFF2-40B4-BE49-F238E27FC236}">
+                <a16:creationId xmlns:a16="http://schemas.microsoft.com/office/drawing/2014/main" id="{CB0A4E36-A985-498F-A557-54DA8EADB7F5}"/>
+              </a:ext>
+            </a:extLst>
+          </p:cNvPr>
+          <p:cNvSpPr txBox="1"/>
           <p:nvPr/>
-        </p:nvPicPr>
-        <p:blipFill>
-          <a:blip r:embed="rId3"/>
-          <a:stretch>
-            <a:fillRect/>
-          </a:stretch>
-        </p:blipFill>
+        </p:nvSpPr>
         <p:spPr>
           <a:xfrm>
-            <a:off x="6026252" y="3369324"/>
-            <a:ext cx="5534025" cy="2105025"/>
+            <a:off x="8073069" y="1817673"/>
+            <a:ext cx="2568271" cy="1754326"/>
           </a:xfrm>
           <a:prstGeom prst="rect">
             <a:avLst/>
           </a:prstGeom>
-        </p:spPr>
-      </p:pic>
+          <a:noFill/>
+        </p:spPr>
+        <p:txBody>
+          <a:bodyPr wrap="square" rtlCol="0">
+            <a:spAutoFit/>
+          </a:bodyPr>
+          <a:lstStyle/>
+          <a:p>
+            <a:r>
+              <a:rPr lang="en-US" dirty="0">
+                <a:solidFill>
+                  <a:schemeClr val="accent1"/>
+                </a:solidFill>
+              </a:rPr>
+              <a:t>BUT: This relationship does not hold within regions. There are likely other factors than income that determine infant survival! </a:t>
+            </a:r>
+          </a:p>
+        </p:txBody>
+      </p:sp>
     </p:spTree>
     <p:extLst>
       <p:ext uri="{BB962C8B-B14F-4D97-AF65-F5344CB8AC3E}">
-        <p14:creationId xmlns:p14="http://schemas.microsoft.com/office/powerpoint/2010/main" val="2436614064"/>
+        <p14:creationId xmlns:p14="http://schemas.microsoft.com/office/powerpoint/2010/main" val="191986968"/>
       </p:ext>
     </p:extLst>
   </p:cSld>
@@ -7187,7 +7216,7 @@
           <p:cNvPr id="2" name="Title 1">
             <a:extLst>
               <a:ext uri="{FF2B5EF4-FFF2-40B4-BE49-F238E27FC236}">
-                <a16:creationId xmlns:a16="http://schemas.microsoft.com/office/drawing/2014/main" id="{D32DECE7-28AB-4514-900E-178F6E780154}"/>
+                <a16:creationId xmlns:a16="http://schemas.microsoft.com/office/drawing/2014/main" id="{B064281A-FA69-4219-90F7-E7A677B6B065}"/>
               </a:ext>
             </a:extLst>
           </p:cNvPr>
@@ -7205,26 +7234,61 @@
           <a:p>
             <a:r>
               <a:rPr lang="en-US" dirty="0"/>
-              <a:t>Segmented bar plots</a:t>
-            </a:r>
+              <a:t>Contingency tables</a:t>
+            </a:r>
+          </a:p>
+        </p:txBody>
+      </p:sp>
+      <p:sp>
+        <p:nvSpPr>
+          <p:cNvPr id="3" name="Content Placeholder 2">
+            <a:extLst>
+              <a:ext uri="{FF2B5EF4-FFF2-40B4-BE49-F238E27FC236}">
+                <a16:creationId xmlns:a16="http://schemas.microsoft.com/office/drawing/2014/main" id="{A6C83290-FCD6-4A34-8DA9-9929E57C3BE6}"/>
+              </a:ext>
+            </a:extLst>
+          </p:cNvPr>
+          <p:cNvSpPr>
+            <a:spLocks noGrp="1"/>
+          </p:cNvSpPr>
+          <p:nvPr>
+            <p:ph idx="1"/>
+          </p:nvPr>
+        </p:nvSpPr>
+        <p:spPr/>
+        <p:txBody>
+          <a:bodyPr/>
+          <a:lstStyle/>
+          <a:p>
+            <a:r>
+              <a:rPr lang="en-US" dirty="0"/>
+              <a:t>Summarize categorical variables, counting the number of times each combination of values occurs in the data</a:t>
+            </a:r>
+          </a:p>
+          <a:p>
+            <a:r>
+              <a:rPr lang="en-US" dirty="0"/>
+              <a:t>Can be converted into proportions (row or column %)</a:t>
+            </a:r>
+          </a:p>
+          <a:p>
+            <a:endParaRPr lang="en-US" dirty="0"/>
           </a:p>
         </p:txBody>
       </p:sp>
       <p:pic>
         <p:nvPicPr>
-          <p:cNvPr id="5" name="Content Placeholder 4">
-            <a:extLst>
-              <a:ext uri="{FF2B5EF4-FFF2-40B4-BE49-F238E27FC236}">
-                <a16:creationId xmlns:a16="http://schemas.microsoft.com/office/drawing/2014/main" id="{E2C6C1C5-72C8-4646-A946-4B2C162DD145}"/>
+          <p:cNvPr id="5" name="Picture 4">
+            <a:extLst>
+              <a:ext uri="{FF2B5EF4-FFF2-40B4-BE49-F238E27FC236}">
+                <a16:creationId xmlns:a16="http://schemas.microsoft.com/office/drawing/2014/main" id="{7C1DA351-5C20-4AA6-9A6D-35241DBC27FC}"/>
               </a:ext>
             </a:extLst>
           </p:cNvPr>
           <p:cNvPicPr>
-            <a:picLocks noGrp="1" noChangeAspect="1"/>
+            <a:picLocks noChangeAspect="1"/>
           </p:cNvPicPr>
-          <p:nvPr>
-            <p:ph idx="1"/>
-          </p:nvPr>
+          <p:nvPr/>
         </p:nvPicPr>
         <p:blipFill>
           <a:blip r:embed="rId2"/>
@@ -7234,15 +7298,48 @@
         </p:blipFill>
         <p:spPr>
           <a:xfrm>
-            <a:off x="1307798" y="1825625"/>
-            <a:ext cx="9576403" cy="4351338"/>
-          </a:xfrm>
+            <a:off x="733425" y="3369324"/>
+            <a:ext cx="4876800" cy="2400300"/>
+          </a:xfrm>
+          <a:prstGeom prst="rect">
+            <a:avLst/>
+          </a:prstGeom>
+        </p:spPr>
+      </p:pic>
+      <p:pic>
+        <p:nvPicPr>
+          <p:cNvPr id="7" name="Picture 6">
+            <a:extLst>
+              <a:ext uri="{FF2B5EF4-FFF2-40B4-BE49-F238E27FC236}">
+                <a16:creationId xmlns:a16="http://schemas.microsoft.com/office/drawing/2014/main" id="{5EADF3BE-DBD9-404A-8031-E44B2338C08B}"/>
+              </a:ext>
+            </a:extLst>
+          </p:cNvPr>
+          <p:cNvPicPr>
+            <a:picLocks noChangeAspect="1"/>
+          </p:cNvPicPr>
+          <p:nvPr/>
+        </p:nvPicPr>
+        <p:blipFill>
+          <a:blip r:embed="rId3"/>
+          <a:stretch>
+            <a:fillRect/>
+          </a:stretch>
+        </p:blipFill>
+        <p:spPr>
+          <a:xfrm>
+            <a:off x="6026252" y="3369324"/>
+            <a:ext cx="5534025" cy="2105025"/>
+          </a:xfrm>
+          <a:prstGeom prst="rect">
+            <a:avLst/>
+          </a:prstGeom>
         </p:spPr>
       </p:pic>
     </p:spTree>
     <p:extLst>
       <p:ext uri="{BB962C8B-B14F-4D97-AF65-F5344CB8AC3E}">
-        <p14:creationId xmlns:p14="http://schemas.microsoft.com/office/powerpoint/2010/main" val="2184618281"/>
+        <p14:creationId xmlns:p14="http://schemas.microsoft.com/office/powerpoint/2010/main" val="2436614064"/>
       </p:ext>
     </p:extLst>
   </p:cSld>
@@ -7274,7 +7371,7 @@
           <p:cNvPr id="2" name="Title 1">
             <a:extLst>
               <a:ext uri="{FF2B5EF4-FFF2-40B4-BE49-F238E27FC236}">
-                <a16:creationId xmlns:a16="http://schemas.microsoft.com/office/drawing/2014/main" id="{46DDB61A-6E21-4617-9C13-8783F76BA817}"/>
+                <a16:creationId xmlns:a16="http://schemas.microsoft.com/office/drawing/2014/main" id="{D32DECE7-28AB-4514-900E-178F6E780154}"/>
               </a:ext>
             </a:extLst>
           </p:cNvPr>
@@ -7302,7 +7399,7 @@
           <p:cNvPr id="5" name="Content Placeholder 4">
             <a:extLst>
               <a:ext uri="{FF2B5EF4-FFF2-40B4-BE49-F238E27FC236}">
-                <a16:creationId xmlns:a16="http://schemas.microsoft.com/office/drawing/2014/main" id="{EB414972-536C-4431-B07D-C90CF87D3906}"/>
+                <a16:creationId xmlns:a16="http://schemas.microsoft.com/office/drawing/2014/main" id="{E2C6C1C5-72C8-4646-A946-4B2C162DD145}"/>
               </a:ext>
             </a:extLst>
           </p:cNvPr>
@@ -7321,15 +7418,15 @@
         </p:blipFill>
         <p:spPr>
           <a:xfrm>
-            <a:off x="1468934" y="1825625"/>
-            <a:ext cx="9254132" cy="4351338"/>
+            <a:off x="1307798" y="1825625"/>
+            <a:ext cx="9576403" cy="4351338"/>
           </a:xfrm>
         </p:spPr>
       </p:pic>
     </p:spTree>
     <p:extLst>
       <p:ext uri="{BB962C8B-B14F-4D97-AF65-F5344CB8AC3E}">
-        <p14:creationId xmlns:p14="http://schemas.microsoft.com/office/powerpoint/2010/main" val="2546378998"/>
+        <p14:creationId xmlns:p14="http://schemas.microsoft.com/office/powerpoint/2010/main" val="2184618281"/>
       </p:ext>
     </p:extLst>
   </p:cSld>
@@ -7361,7 +7458,7 @@
           <p:cNvPr id="2" name="Title 1">
             <a:extLst>
               <a:ext uri="{FF2B5EF4-FFF2-40B4-BE49-F238E27FC236}">
-                <a16:creationId xmlns:a16="http://schemas.microsoft.com/office/drawing/2014/main" id="{A6B7E876-1873-48D7-9BC7-5522FFD2C2D4}"/>
+                <a16:creationId xmlns:a16="http://schemas.microsoft.com/office/drawing/2014/main" id="{46DDB61A-6E21-4617-9C13-8783F76BA817}"/>
               </a:ext>
             </a:extLst>
           </p:cNvPr>
@@ -7379,7 +7476,7 @@
           <a:p>
             <a:r>
               <a:rPr lang="en-US" dirty="0"/>
-              <a:t>Categorical and numerical variables</a:t>
+              <a:t>Segmented bar plots</a:t>
             </a:r>
           </a:p>
         </p:txBody>
@@ -7389,7 +7486,7 @@
           <p:cNvPr id="5" name="Content Placeholder 4">
             <a:extLst>
               <a:ext uri="{FF2B5EF4-FFF2-40B4-BE49-F238E27FC236}">
-                <a16:creationId xmlns:a16="http://schemas.microsoft.com/office/drawing/2014/main" id="{A861E6C9-141D-4654-A4FD-602849BA570F}"/>
+                <a16:creationId xmlns:a16="http://schemas.microsoft.com/office/drawing/2014/main" id="{EB414972-536C-4431-B07D-C90CF87D3906}"/>
               </a:ext>
             </a:extLst>
           </p:cNvPr>
@@ -7408,15 +7505,15 @@
         </p:blipFill>
         <p:spPr>
           <a:xfrm>
-            <a:off x="3254478" y="1825625"/>
-            <a:ext cx="5683044" cy="4351338"/>
+            <a:off x="1468934" y="1825625"/>
+            <a:ext cx="9254132" cy="4351338"/>
           </a:xfrm>
         </p:spPr>
       </p:pic>
     </p:spTree>
     <p:extLst>
       <p:ext uri="{BB962C8B-B14F-4D97-AF65-F5344CB8AC3E}">
-        <p14:creationId xmlns:p14="http://schemas.microsoft.com/office/powerpoint/2010/main" val="1337816270"/>
+        <p14:creationId xmlns:p14="http://schemas.microsoft.com/office/powerpoint/2010/main" val="2546378998"/>
       </p:ext>
     </p:extLst>
   </p:cSld>
@@ -7448,7 +7545,7 @@
           <p:cNvPr id="2" name="Title 1">
             <a:extLst>
               <a:ext uri="{FF2B5EF4-FFF2-40B4-BE49-F238E27FC236}">
-                <a16:creationId xmlns:a16="http://schemas.microsoft.com/office/drawing/2014/main" id="{7EA000EC-D5E1-496A-960D-C42FC98C6C6D}"/>
+                <a16:creationId xmlns:a16="http://schemas.microsoft.com/office/drawing/2014/main" id="{A6B7E876-1873-48D7-9BC7-5522FFD2C2D4}"/>
               </a:ext>
             </a:extLst>
           </p:cNvPr>
@@ -7466,40 +7563,44 @@
           <a:p>
             <a:r>
               <a:rPr lang="en-US" dirty="0"/>
-              <a:t>Some data visualization principles</a:t>
-            </a:r>
-          </a:p>
-        </p:txBody>
-      </p:sp>
-      <p:sp>
-        <p:nvSpPr>
-          <p:cNvPr id="3" name="Text Placeholder 2">
-            <a:extLst>
-              <a:ext uri="{FF2B5EF4-FFF2-40B4-BE49-F238E27FC236}">
-                <a16:creationId xmlns:a16="http://schemas.microsoft.com/office/drawing/2014/main" id="{9F348BB5-9257-4747-9298-E9341B313D6B}"/>
-              </a:ext>
-            </a:extLst>
-          </p:cNvPr>
-          <p:cNvSpPr>
-            <a:spLocks noGrp="1"/>
-          </p:cNvSpPr>
-          <p:nvPr>
-            <p:ph type="body" idx="1"/>
-          </p:nvPr>
-        </p:nvSpPr>
-        <p:spPr/>
-        <p:txBody>
-          <a:bodyPr/>
-          <a:lstStyle/>
-          <a:p>
-            <a:endParaRPr lang="en-US" dirty="0"/>
-          </a:p>
-        </p:txBody>
-      </p:sp>
+              <a:t>Categorical and numerical variables</a:t>
+            </a:r>
+          </a:p>
+        </p:txBody>
+      </p:sp>
+      <p:pic>
+        <p:nvPicPr>
+          <p:cNvPr id="5" name="Content Placeholder 4">
+            <a:extLst>
+              <a:ext uri="{FF2B5EF4-FFF2-40B4-BE49-F238E27FC236}">
+                <a16:creationId xmlns:a16="http://schemas.microsoft.com/office/drawing/2014/main" id="{A861E6C9-141D-4654-A4FD-602849BA570F}"/>
+              </a:ext>
+            </a:extLst>
+          </p:cNvPr>
+          <p:cNvPicPr>
+            <a:picLocks noGrp="1" noChangeAspect="1"/>
+          </p:cNvPicPr>
+          <p:nvPr>
+            <p:ph idx="1"/>
+          </p:nvPr>
+        </p:nvPicPr>
+        <p:blipFill>
+          <a:blip r:embed="rId2"/>
+          <a:stretch>
+            <a:fillRect/>
+          </a:stretch>
+        </p:blipFill>
+        <p:spPr>
+          <a:xfrm>
+            <a:off x="3254478" y="1825625"/>
+            <a:ext cx="5683044" cy="4351338"/>
+          </a:xfrm>
+        </p:spPr>
+      </p:pic>
     </p:spTree>
     <p:extLst>
       <p:ext uri="{BB962C8B-B14F-4D97-AF65-F5344CB8AC3E}">
-        <p14:creationId xmlns:p14="http://schemas.microsoft.com/office/powerpoint/2010/main" val="495586785"/>
+        <p14:creationId xmlns:p14="http://schemas.microsoft.com/office/powerpoint/2010/main" val="1337816270"/>
       </p:ext>
     </p:extLst>
   </p:cSld>
@@ -7923,7 +8024,7 @@
           <p:cNvPr id="2" name="Title 1">
             <a:extLst>
               <a:ext uri="{FF2B5EF4-FFF2-40B4-BE49-F238E27FC236}">
-                <a16:creationId xmlns:a16="http://schemas.microsoft.com/office/drawing/2014/main" id="{FD3C8588-18AA-4155-B176-B2A3A15569FD}"/>
+                <a16:creationId xmlns:a16="http://schemas.microsoft.com/office/drawing/2014/main" id="{7EA000EC-D5E1-496A-960D-C42FC98C6C6D}"/>
               </a:ext>
             </a:extLst>
           </p:cNvPr>
@@ -7941,160 +8042,40 @@
           <a:p>
             <a:r>
               <a:rPr lang="en-US" dirty="0"/>
-              <a:t>Be sure to include 0 when appropriate</a:t>
-            </a:r>
-          </a:p>
-        </p:txBody>
-      </p:sp>
-      <p:pic>
-        <p:nvPicPr>
-          <p:cNvPr id="4" name="Picture 3">
-            <a:extLst>
-              <a:ext uri="{FF2B5EF4-FFF2-40B4-BE49-F238E27FC236}">
-                <a16:creationId xmlns:a16="http://schemas.microsoft.com/office/drawing/2014/main" id="{980B5648-F9CD-44EB-9C6C-8A96F785FACF}"/>
-              </a:ext>
-            </a:extLst>
-          </p:cNvPr>
-          <p:cNvPicPr>
-            <a:picLocks noChangeAspect="1"/>
-          </p:cNvPicPr>
-          <p:nvPr/>
-        </p:nvPicPr>
-        <p:blipFill>
-          <a:blip r:embed="rId2"/>
-          <a:stretch>
-            <a:fillRect/>
-          </a:stretch>
-        </p:blipFill>
-        <p:spPr>
-          <a:xfrm>
-            <a:off x="976851" y="1690688"/>
-            <a:ext cx="4493647" cy="2661131"/>
-          </a:xfrm>
-          <a:prstGeom prst="rect">
-            <a:avLst/>
-          </a:prstGeom>
-        </p:spPr>
-      </p:pic>
-      <p:pic>
-        <p:nvPicPr>
-          <p:cNvPr id="5" name="Picture 4">
-            <a:extLst>
-              <a:ext uri="{FF2B5EF4-FFF2-40B4-BE49-F238E27FC236}">
-                <a16:creationId xmlns:a16="http://schemas.microsoft.com/office/drawing/2014/main" id="{00A949FC-CDE5-415A-859B-37F628F33903}"/>
-              </a:ext>
-            </a:extLst>
-          </p:cNvPr>
-          <p:cNvPicPr>
-            <a:picLocks noChangeAspect="1"/>
-          </p:cNvPicPr>
-          <p:nvPr/>
-        </p:nvPicPr>
-        <p:blipFill>
-          <a:blip r:embed="rId3"/>
-          <a:stretch>
-            <a:fillRect/>
-          </a:stretch>
-        </p:blipFill>
-        <p:spPr>
-          <a:xfrm>
-            <a:off x="5763555" y="2878373"/>
-            <a:ext cx="5747283" cy="3547151"/>
-          </a:xfrm>
-          <a:prstGeom prst="rect">
-            <a:avLst/>
-          </a:prstGeom>
-        </p:spPr>
-      </p:pic>
-      <p:sp>
-        <p:nvSpPr>
-          <p:cNvPr id="6" name="Arrow: Curved Down 5">
-            <a:extLst>
-              <a:ext uri="{FF2B5EF4-FFF2-40B4-BE49-F238E27FC236}">
-                <a16:creationId xmlns:a16="http://schemas.microsoft.com/office/drawing/2014/main" id="{A4A15C53-8CBE-48E0-8AE6-C55AA3DCBCFE}"/>
-              </a:ext>
-            </a:extLst>
-          </p:cNvPr>
-          <p:cNvSpPr/>
-          <p:nvPr/>
-        </p:nvSpPr>
-        <p:spPr>
-          <a:xfrm>
-            <a:off x="6096000" y="1786105"/>
-            <a:ext cx="1232452" cy="580445"/>
-          </a:xfrm>
-          <a:prstGeom prst="curvedDownArrow">
-            <a:avLst/>
-          </a:prstGeom>
-        </p:spPr>
-        <p:style>
-          <a:lnRef idx="2">
-            <a:schemeClr val="accent1">
-              <a:shade val="50000"/>
-            </a:schemeClr>
-          </a:lnRef>
-          <a:fillRef idx="1">
-            <a:schemeClr val="accent1"/>
-          </a:fillRef>
-          <a:effectRef idx="0">
-            <a:schemeClr val="accent1"/>
-          </a:effectRef>
-          <a:fontRef idx="minor">
-            <a:schemeClr val="lt1"/>
-          </a:fontRef>
-        </p:style>
-        <p:txBody>
-          <a:bodyPr rtlCol="0" anchor="ctr"/>
-          <a:lstStyle/>
-          <a:p>
-            <a:pPr algn="ctr"/>
-            <a:endParaRPr lang="en-US">
-              <a:solidFill>
-                <a:schemeClr val="tx1"/>
-              </a:solidFill>
-            </a:endParaRPr>
-          </a:p>
-        </p:txBody>
-      </p:sp>
-      <p:sp>
-        <p:nvSpPr>
-          <p:cNvPr id="7" name="TextBox 6">
-            <a:extLst>
-              <a:ext uri="{FF2B5EF4-FFF2-40B4-BE49-F238E27FC236}">
-                <a16:creationId xmlns:a16="http://schemas.microsoft.com/office/drawing/2014/main" id="{2A50B5F9-42DE-46C1-BF32-57BDD6ED8041}"/>
-              </a:ext>
-            </a:extLst>
-          </p:cNvPr>
-          <p:cNvSpPr txBox="1"/>
-          <p:nvPr/>
-        </p:nvSpPr>
-        <p:spPr>
-          <a:xfrm>
-            <a:off x="7601447" y="2099864"/>
-            <a:ext cx="3116911" cy="369332"/>
-          </a:xfrm>
-          <a:prstGeom prst="rect">
-            <a:avLst/>
-          </a:prstGeom>
-          <a:noFill/>
-        </p:spPr>
-        <p:txBody>
-          <a:bodyPr wrap="square" rtlCol="0">
-            <a:spAutoFit/>
-          </a:bodyPr>
-          <a:lstStyle/>
-          <a:p>
-            <a:r>
-              <a:rPr lang="en-US" dirty="0"/>
-              <a:t>Correct graph</a:t>
-            </a:r>
+              <a:t>Some data visualization principles</a:t>
+            </a:r>
+          </a:p>
+        </p:txBody>
+      </p:sp>
+      <p:sp>
+        <p:nvSpPr>
+          <p:cNvPr id="3" name="Text Placeholder 2">
+            <a:extLst>
+              <a:ext uri="{FF2B5EF4-FFF2-40B4-BE49-F238E27FC236}">
+                <a16:creationId xmlns:a16="http://schemas.microsoft.com/office/drawing/2014/main" id="{9F348BB5-9257-4747-9298-E9341B313D6B}"/>
+              </a:ext>
+            </a:extLst>
+          </p:cNvPr>
+          <p:cNvSpPr>
+            <a:spLocks noGrp="1"/>
+          </p:cNvSpPr>
+          <p:nvPr>
+            <p:ph type="body" idx="1"/>
+          </p:nvPr>
+        </p:nvSpPr>
+        <p:spPr/>
+        <p:txBody>
+          <a:bodyPr/>
+          <a:lstStyle/>
+          <a:p>
+            <a:endParaRPr lang="en-US" dirty="0"/>
           </a:p>
         </p:txBody>
       </p:sp>
     </p:spTree>
     <p:extLst>
       <p:ext uri="{BB962C8B-B14F-4D97-AF65-F5344CB8AC3E}">
-        <p14:creationId xmlns:p14="http://schemas.microsoft.com/office/powerpoint/2010/main" val="3728966079"/>
+        <p14:creationId xmlns:p14="http://schemas.microsoft.com/office/powerpoint/2010/main" val="495586785"/>
       </p:ext>
     </p:extLst>
   </p:cSld>
@@ -8126,7 +8107,7 @@
           <p:cNvPr id="2" name="Title 1">
             <a:extLst>
               <a:ext uri="{FF2B5EF4-FFF2-40B4-BE49-F238E27FC236}">
-                <a16:creationId xmlns:a16="http://schemas.microsoft.com/office/drawing/2014/main" id="{721F62ED-5C3C-48F8-84FF-2BE900F9353E}"/>
+                <a16:creationId xmlns:a16="http://schemas.microsoft.com/office/drawing/2014/main" id="{FD3C8588-18AA-4155-B176-B2A3A15569FD}"/>
               </a:ext>
             </a:extLst>
           </p:cNvPr>
@@ -8144,62 +8125,160 @@
           <a:p>
             <a:r>
               <a:rPr lang="en-US" dirty="0"/>
-              <a:t>Order categories when meaningful</a:t>
+              <a:t>Be sure to include 0 when appropriate</a:t>
             </a:r>
           </a:p>
         </p:txBody>
       </p:sp>
       <p:pic>
         <p:nvPicPr>
-          <p:cNvPr id="1026" name="Picture 2">
-            <a:extLst>
-              <a:ext uri="{FF2B5EF4-FFF2-40B4-BE49-F238E27FC236}">
-                <a16:creationId xmlns:a16="http://schemas.microsoft.com/office/drawing/2014/main" id="{3C6F95D1-C209-4CB5-8E58-1C70C59142BD}"/>
+          <p:cNvPr id="4" name="Picture 3">
+            <a:extLst>
+              <a:ext uri="{FF2B5EF4-FFF2-40B4-BE49-F238E27FC236}">
+                <a16:creationId xmlns:a16="http://schemas.microsoft.com/office/drawing/2014/main" id="{980B5648-F9CD-44EB-9C6C-8A96F785FACF}"/>
               </a:ext>
             </a:extLst>
           </p:cNvPr>
           <p:cNvPicPr>
-            <a:picLocks noChangeAspect="1" noChangeArrowheads="1"/>
+            <a:picLocks noChangeAspect="1"/>
           </p:cNvPicPr>
           <p:nvPr/>
         </p:nvPicPr>
         <p:blipFill>
-          <a:blip r:embed="rId2">
-            <a:extLst>
-              <a:ext uri="{28A0092B-C50C-407E-A947-70E740481C1C}">
-                <a14:useLocalDpi xmlns:a14="http://schemas.microsoft.com/office/drawing/2010/main" val="0"/>
-              </a:ext>
-            </a:extLst>
-          </a:blip>
-          <a:srcRect/>
+          <a:blip r:embed="rId2"/>
           <a:stretch>
             <a:fillRect/>
           </a:stretch>
         </p:blipFill>
-        <p:spPr bwMode="auto">
-          <a:xfrm>
-            <a:off x="2529839" y="1488861"/>
-            <a:ext cx="5822663" cy="4852219"/>
+        <p:spPr>
+          <a:xfrm>
+            <a:off x="976851" y="1690688"/>
+            <a:ext cx="4493647" cy="2661131"/>
+          </a:xfrm>
+          <a:prstGeom prst="rect">
+            <a:avLst/>
+          </a:prstGeom>
+        </p:spPr>
+      </p:pic>
+      <p:pic>
+        <p:nvPicPr>
+          <p:cNvPr id="5" name="Picture 4">
+            <a:extLst>
+              <a:ext uri="{FF2B5EF4-FFF2-40B4-BE49-F238E27FC236}">
+                <a16:creationId xmlns:a16="http://schemas.microsoft.com/office/drawing/2014/main" id="{00A949FC-CDE5-415A-859B-37F628F33903}"/>
+              </a:ext>
+            </a:extLst>
+          </p:cNvPr>
+          <p:cNvPicPr>
+            <a:picLocks noChangeAspect="1"/>
+          </p:cNvPicPr>
+          <p:nvPr/>
+        </p:nvPicPr>
+        <p:blipFill>
+          <a:blip r:embed="rId3"/>
+          <a:stretch>
+            <a:fillRect/>
+          </a:stretch>
+        </p:blipFill>
+        <p:spPr>
+          <a:xfrm>
+            <a:off x="5763555" y="2878373"/>
+            <a:ext cx="5747283" cy="3547151"/>
+          </a:xfrm>
+          <a:prstGeom prst="rect">
+            <a:avLst/>
+          </a:prstGeom>
+        </p:spPr>
+      </p:pic>
+      <p:sp>
+        <p:nvSpPr>
+          <p:cNvPr id="6" name="Arrow: Curved Down 5">
+            <a:extLst>
+              <a:ext uri="{FF2B5EF4-FFF2-40B4-BE49-F238E27FC236}">
+                <a16:creationId xmlns:a16="http://schemas.microsoft.com/office/drawing/2014/main" id="{A4A15C53-8CBE-48E0-8AE6-C55AA3DCBCFE}"/>
+              </a:ext>
+            </a:extLst>
+          </p:cNvPr>
+          <p:cNvSpPr/>
+          <p:nvPr/>
+        </p:nvSpPr>
+        <p:spPr>
+          <a:xfrm>
+            <a:off x="6096000" y="1786105"/>
+            <a:ext cx="1232452" cy="580445"/>
+          </a:xfrm>
+          <a:prstGeom prst="curvedDownArrow">
+            <a:avLst/>
+          </a:prstGeom>
+        </p:spPr>
+        <p:style>
+          <a:lnRef idx="2">
+            <a:schemeClr val="accent1">
+              <a:shade val="50000"/>
+            </a:schemeClr>
+          </a:lnRef>
+          <a:fillRef idx="1">
+            <a:schemeClr val="accent1"/>
+          </a:fillRef>
+          <a:effectRef idx="0">
+            <a:schemeClr val="accent1"/>
+          </a:effectRef>
+          <a:fontRef idx="minor">
+            <a:schemeClr val="lt1"/>
+          </a:fontRef>
+        </p:style>
+        <p:txBody>
+          <a:bodyPr rtlCol="0" anchor="ctr"/>
+          <a:lstStyle/>
+          <a:p>
+            <a:pPr algn="ctr"/>
+            <a:endParaRPr lang="en-US">
+              <a:solidFill>
+                <a:schemeClr val="tx1"/>
+              </a:solidFill>
+            </a:endParaRPr>
+          </a:p>
+        </p:txBody>
+      </p:sp>
+      <p:sp>
+        <p:nvSpPr>
+          <p:cNvPr id="7" name="TextBox 6">
+            <a:extLst>
+              <a:ext uri="{FF2B5EF4-FFF2-40B4-BE49-F238E27FC236}">
+                <a16:creationId xmlns:a16="http://schemas.microsoft.com/office/drawing/2014/main" id="{2A50B5F9-42DE-46C1-BF32-57BDD6ED8041}"/>
+              </a:ext>
+            </a:extLst>
+          </p:cNvPr>
+          <p:cNvSpPr txBox="1"/>
+          <p:nvPr/>
+        </p:nvSpPr>
+        <p:spPr>
+          <a:xfrm>
+            <a:off x="7601447" y="2099864"/>
+            <a:ext cx="3116911" cy="369332"/>
           </a:xfrm>
           <a:prstGeom prst="rect">
             <a:avLst/>
           </a:prstGeom>
           <a:noFill/>
-          <a:extLst>
-            <a:ext uri="{909E8E84-426E-40DD-AFC4-6F175D3DCCD1}">
-              <a14:hiddenFill xmlns:a14="http://schemas.microsoft.com/office/drawing/2010/main">
-                <a:solidFill>
-                  <a:srgbClr val="FFFFFF"/>
-                </a:solidFill>
-              </a14:hiddenFill>
-            </a:ext>
-          </a:extLst>
-        </p:spPr>
-      </p:pic>
+        </p:spPr>
+        <p:txBody>
+          <a:bodyPr wrap="square" rtlCol="0">
+            <a:spAutoFit/>
+          </a:bodyPr>
+          <a:lstStyle/>
+          <a:p>
+            <a:r>
+              <a:rPr lang="en-US" dirty="0"/>
+              <a:t>Correct graph</a:t>
+            </a:r>
+          </a:p>
+        </p:txBody>
+      </p:sp>
     </p:spTree>
     <p:extLst>
       <p:ext uri="{BB962C8B-B14F-4D97-AF65-F5344CB8AC3E}">
-        <p14:creationId xmlns:p14="http://schemas.microsoft.com/office/powerpoint/2010/main" val="3799945262"/>
+        <p14:creationId xmlns:p14="http://schemas.microsoft.com/office/powerpoint/2010/main" val="3728966079"/>
       </p:ext>
     </p:extLst>
   </p:cSld>
@@ -8228,10 +8307,10 @@
       </p:grpSpPr>
       <p:sp>
         <p:nvSpPr>
-          <p:cNvPr id="4" name="Title 3">
-            <a:extLst>
-              <a:ext uri="{FF2B5EF4-FFF2-40B4-BE49-F238E27FC236}">
-                <a16:creationId xmlns:a16="http://schemas.microsoft.com/office/drawing/2014/main" id="{DF5EE352-7B6E-41CC-9403-38405F92F816}"/>
+          <p:cNvPr id="2" name="Title 1">
+            <a:extLst>
+              <a:ext uri="{FF2B5EF4-FFF2-40B4-BE49-F238E27FC236}">
+                <a16:creationId xmlns:a16="http://schemas.microsoft.com/office/drawing/2014/main" id="{721F62ED-5C3C-48F8-84FF-2BE900F9353E}"/>
               </a:ext>
             </a:extLst>
           </p:cNvPr>
@@ -8249,75 +8328,62 @@
           <a:p>
             <a:r>
               <a:rPr lang="en-US" dirty="0"/>
-              <a:t>Show the data!</a:t>
+              <a:t>Order categories when meaningful</a:t>
             </a:r>
           </a:p>
         </p:txBody>
       </p:sp>
       <p:pic>
         <p:nvPicPr>
-          <p:cNvPr id="5" name="Picture 4">
-            <a:extLst>
-              <a:ext uri="{FF2B5EF4-FFF2-40B4-BE49-F238E27FC236}">
-                <a16:creationId xmlns:a16="http://schemas.microsoft.com/office/drawing/2014/main" id="{96CF8961-5B32-4677-8D85-D7241B16D3E9}"/>
+          <p:cNvPr id="1026" name="Picture 2">
+            <a:extLst>
+              <a:ext uri="{FF2B5EF4-FFF2-40B4-BE49-F238E27FC236}">
+                <a16:creationId xmlns:a16="http://schemas.microsoft.com/office/drawing/2014/main" id="{3C6F95D1-C209-4CB5-8E58-1C70C59142BD}"/>
               </a:ext>
             </a:extLst>
           </p:cNvPr>
           <p:cNvPicPr>
-            <a:picLocks noChangeAspect="1"/>
+            <a:picLocks noChangeAspect="1" noChangeArrowheads="1"/>
           </p:cNvPicPr>
           <p:nvPr/>
         </p:nvPicPr>
         <p:blipFill>
-          <a:blip r:embed="rId2"/>
+          <a:blip r:embed="rId2">
+            <a:extLst>
+              <a:ext uri="{28A0092B-C50C-407E-A947-70E740481C1C}">
+                <a14:useLocalDpi xmlns:a14="http://schemas.microsoft.com/office/drawing/2010/main" val="0"/>
+              </a:ext>
+            </a:extLst>
+          </a:blip>
+          <a:srcRect/>
           <a:stretch>
             <a:fillRect/>
           </a:stretch>
         </p:blipFill>
-        <p:spPr>
-          <a:xfrm>
-            <a:off x="838200" y="2194559"/>
-            <a:ext cx="4157805" cy="4157805"/>
+        <p:spPr bwMode="auto">
+          <a:xfrm>
+            <a:off x="2529839" y="1488861"/>
+            <a:ext cx="5822663" cy="4852219"/>
           </a:xfrm>
           <a:prstGeom prst="rect">
             <a:avLst/>
           </a:prstGeom>
-        </p:spPr>
-      </p:pic>
-      <p:pic>
-        <p:nvPicPr>
-          <p:cNvPr id="6" name="Picture 5">
-            <a:extLst>
-              <a:ext uri="{FF2B5EF4-FFF2-40B4-BE49-F238E27FC236}">
-                <a16:creationId xmlns:a16="http://schemas.microsoft.com/office/drawing/2014/main" id="{F3917B31-2B01-4F01-B537-75DB565F12DE}"/>
-              </a:ext>
-            </a:extLst>
-          </p:cNvPr>
-          <p:cNvPicPr>
-            <a:picLocks noChangeAspect="1"/>
-          </p:cNvPicPr>
-          <p:nvPr/>
-        </p:nvPicPr>
-        <p:blipFill>
-          <a:blip r:embed="rId3"/>
-          <a:stretch>
-            <a:fillRect/>
-          </a:stretch>
-        </p:blipFill>
-        <p:spPr>
-          <a:xfrm>
-            <a:off x="5311749" y="1622067"/>
-            <a:ext cx="6314140" cy="3897008"/>
-          </a:xfrm>
-          <a:prstGeom prst="rect">
-            <a:avLst/>
-          </a:prstGeom>
+          <a:noFill/>
+          <a:extLst>
+            <a:ext uri="{909E8E84-426E-40DD-AFC4-6F175D3DCCD1}">
+              <a14:hiddenFill xmlns:a14="http://schemas.microsoft.com/office/drawing/2010/main">
+                <a:solidFill>
+                  <a:srgbClr val="FFFFFF"/>
+                </a:solidFill>
+              </a14:hiddenFill>
+            </a:ext>
+          </a:extLst>
         </p:spPr>
       </p:pic>
     </p:spTree>
     <p:extLst>
       <p:ext uri="{BB962C8B-B14F-4D97-AF65-F5344CB8AC3E}">
-        <p14:creationId xmlns:p14="http://schemas.microsoft.com/office/powerpoint/2010/main" val="1833247154"/>
+        <p14:creationId xmlns:p14="http://schemas.microsoft.com/office/powerpoint/2010/main" val="3799945262"/>
       </p:ext>
     </p:extLst>
   </p:cSld>
@@ -8346,10 +8412,10 @@
       </p:grpSpPr>
       <p:sp>
         <p:nvSpPr>
-          <p:cNvPr id="2" name="Title 1">
-            <a:extLst>
-              <a:ext uri="{FF2B5EF4-FFF2-40B4-BE49-F238E27FC236}">
-                <a16:creationId xmlns:a16="http://schemas.microsoft.com/office/drawing/2014/main" id="{B26FEB73-B056-45F9-869C-76201BC3DD5B}"/>
+          <p:cNvPr id="4" name="Title 3">
+            <a:extLst>
+              <a:ext uri="{FF2B5EF4-FFF2-40B4-BE49-F238E27FC236}">
+                <a16:creationId xmlns:a16="http://schemas.microsoft.com/office/drawing/2014/main" id="{DF5EE352-7B6E-41CC-9403-38405F92F816}"/>
               </a:ext>
             </a:extLst>
           </p:cNvPr>
@@ -8367,17 +8433,17 @@
           <a:p>
             <a:r>
               <a:rPr lang="en-US" dirty="0"/>
-              <a:t>Align plots to make comparisons easier</a:t>
+              <a:t>Show the data!</a:t>
             </a:r>
           </a:p>
         </p:txBody>
       </p:sp>
       <p:pic>
         <p:nvPicPr>
-          <p:cNvPr id="3" name="Picture 2">
-            <a:extLst>
-              <a:ext uri="{FF2B5EF4-FFF2-40B4-BE49-F238E27FC236}">
-                <a16:creationId xmlns:a16="http://schemas.microsoft.com/office/drawing/2014/main" id="{0E39DFE5-4026-4046-84E4-3ED38D42A1D3}"/>
+          <p:cNvPr id="5" name="Picture 4">
+            <a:extLst>
+              <a:ext uri="{FF2B5EF4-FFF2-40B4-BE49-F238E27FC236}">
+                <a16:creationId xmlns:a16="http://schemas.microsoft.com/office/drawing/2014/main" id="{96CF8961-5B32-4677-8D85-D7241B16D3E9}"/>
               </a:ext>
             </a:extLst>
           </p:cNvPr>
@@ -8394,53 +8460,48 @@
         </p:blipFill>
         <p:spPr>
           <a:xfrm>
-            <a:off x="838201" y="1759975"/>
-            <a:ext cx="6977932" cy="4306692"/>
+            <a:off x="838200" y="2194559"/>
+            <a:ext cx="4157805" cy="4157805"/>
           </a:xfrm>
           <a:prstGeom prst="rect">
             <a:avLst/>
           </a:prstGeom>
         </p:spPr>
       </p:pic>
-      <p:sp>
-        <p:nvSpPr>
-          <p:cNvPr id="4" name="TextBox 3">
-            <a:extLst>
-              <a:ext uri="{FF2B5EF4-FFF2-40B4-BE49-F238E27FC236}">
-                <a16:creationId xmlns:a16="http://schemas.microsoft.com/office/drawing/2014/main" id="{61105A2D-7E3C-4B3C-BEB1-D8574627ED51}"/>
-              </a:ext>
-            </a:extLst>
-          </p:cNvPr>
-          <p:cNvSpPr txBox="1"/>
+      <p:pic>
+        <p:nvPicPr>
+          <p:cNvPr id="6" name="Picture 5">
+            <a:extLst>
+              <a:ext uri="{FF2B5EF4-FFF2-40B4-BE49-F238E27FC236}">
+                <a16:creationId xmlns:a16="http://schemas.microsoft.com/office/drawing/2014/main" id="{F3917B31-2B01-4F01-B537-75DB565F12DE}"/>
+              </a:ext>
+            </a:extLst>
+          </p:cNvPr>
+          <p:cNvPicPr>
+            <a:picLocks noChangeAspect="1"/>
+          </p:cNvPicPr>
           <p:nvPr/>
-        </p:nvSpPr>
+        </p:nvPicPr>
+        <p:blipFill>
+          <a:blip r:embed="rId3"/>
+          <a:stretch>
+            <a:fillRect/>
+          </a:stretch>
+        </p:blipFill>
         <p:spPr>
           <a:xfrm>
-            <a:off x="8136173" y="1784442"/>
-            <a:ext cx="2868433" cy="1323439"/>
+            <a:off x="5311749" y="1622067"/>
+            <a:ext cx="6314140" cy="3897008"/>
           </a:xfrm>
           <a:prstGeom prst="rect">
             <a:avLst/>
           </a:prstGeom>
-          <a:noFill/>
-        </p:spPr>
-        <p:txBody>
-          <a:bodyPr wrap="square" rtlCol="0">
-            <a:spAutoFit/>
-          </a:bodyPr>
-          <a:lstStyle/>
-          <a:p>
-            <a:r>
-              <a:rPr lang="en-US" sz="2000" dirty="0"/>
-              <a:t>Vertical alignment for horizontal comparisons and horizontal alignment for vertical comparisons</a:t>
-            </a:r>
-          </a:p>
-        </p:txBody>
-      </p:sp>
+        </p:spPr>
+      </p:pic>
     </p:spTree>
     <p:extLst>
       <p:ext uri="{BB962C8B-B14F-4D97-AF65-F5344CB8AC3E}">
-        <p14:creationId xmlns:p14="http://schemas.microsoft.com/office/powerpoint/2010/main" val="572746813"/>
+        <p14:creationId xmlns:p14="http://schemas.microsoft.com/office/powerpoint/2010/main" val="1833247154"/>
       </p:ext>
     </p:extLst>
   </p:cSld>
@@ -8472,7 +8533,7 @@
           <p:cNvPr id="2" name="Title 1">
             <a:extLst>
               <a:ext uri="{FF2B5EF4-FFF2-40B4-BE49-F238E27FC236}">
-                <a16:creationId xmlns:a16="http://schemas.microsoft.com/office/drawing/2014/main" id="{539FC57C-F99E-40E5-B504-E1A7D3D4C71B}"/>
+                <a16:creationId xmlns:a16="http://schemas.microsoft.com/office/drawing/2014/main" id="{B26FEB73-B056-45F9-869C-76201BC3DD5B}"/>
               </a:ext>
             </a:extLst>
           </p:cNvPr>
@@ -8490,7 +8551,7 @@
           <a:p>
             <a:r>
               <a:rPr lang="en-US" dirty="0"/>
-              <a:t>Do NOT use 3D and pie charts!</a:t>
+              <a:t>Align plots to make comparisons easier</a:t>
             </a:r>
           </a:p>
         </p:txBody>
@@ -8500,7 +8561,7 @@
           <p:cNvPr id="3" name="Picture 2">
             <a:extLst>
               <a:ext uri="{FF2B5EF4-FFF2-40B4-BE49-F238E27FC236}">
-                <a16:creationId xmlns:a16="http://schemas.microsoft.com/office/drawing/2014/main" id="{35C3A405-7808-4FA0-A669-CA660AFA05CC}"/>
+                <a16:creationId xmlns:a16="http://schemas.microsoft.com/office/drawing/2014/main" id="{0E39DFE5-4026-4046-84E4-3ED38D42A1D3}"/>
               </a:ext>
             </a:extLst>
           </p:cNvPr>
@@ -8517,6 +8578,129 @@
         </p:blipFill>
         <p:spPr>
           <a:xfrm>
+            <a:off x="838201" y="1759975"/>
+            <a:ext cx="6977932" cy="4306692"/>
+          </a:xfrm>
+          <a:prstGeom prst="rect">
+            <a:avLst/>
+          </a:prstGeom>
+        </p:spPr>
+      </p:pic>
+      <p:sp>
+        <p:nvSpPr>
+          <p:cNvPr id="4" name="TextBox 3">
+            <a:extLst>
+              <a:ext uri="{FF2B5EF4-FFF2-40B4-BE49-F238E27FC236}">
+                <a16:creationId xmlns:a16="http://schemas.microsoft.com/office/drawing/2014/main" id="{61105A2D-7E3C-4B3C-BEB1-D8574627ED51}"/>
+              </a:ext>
+            </a:extLst>
+          </p:cNvPr>
+          <p:cNvSpPr txBox="1"/>
+          <p:nvPr/>
+        </p:nvSpPr>
+        <p:spPr>
+          <a:xfrm>
+            <a:off x="8136173" y="1784442"/>
+            <a:ext cx="2868433" cy="1323439"/>
+          </a:xfrm>
+          <a:prstGeom prst="rect">
+            <a:avLst/>
+          </a:prstGeom>
+          <a:noFill/>
+        </p:spPr>
+        <p:txBody>
+          <a:bodyPr wrap="square" rtlCol="0">
+            <a:spAutoFit/>
+          </a:bodyPr>
+          <a:lstStyle/>
+          <a:p>
+            <a:r>
+              <a:rPr lang="en-US" sz="2000" dirty="0"/>
+              <a:t>Vertical alignment for horizontal comparisons and horizontal alignment for vertical comparisons</a:t>
+            </a:r>
+          </a:p>
+        </p:txBody>
+      </p:sp>
+    </p:spTree>
+    <p:extLst>
+      <p:ext uri="{BB962C8B-B14F-4D97-AF65-F5344CB8AC3E}">
+        <p14:creationId xmlns:p14="http://schemas.microsoft.com/office/powerpoint/2010/main" val="572746813"/>
+      </p:ext>
+    </p:extLst>
+  </p:cSld>
+  <p:clrMapOvr>
+    <a:masterClrMapping/>
+  </p:clrMapOvr>
+</p:sld>
+</file>
+
+<file path=ppt/slides/slide45.xml><?xml version="1.0" encoding="utf-8"?>
+<p:sld xmlns:a="http://schemas.openxmlformats.org/drawingml/2006/main" xmlns:r="http://schemas.openxmlformats.org/officeDocument/2006/relationships" xmlns:p="http://schemas.openxmlformats.org/presentationml/2006/main">
+  <p:cSld>
+    <p:spTree>
+      <p:nvGrpSpPr>
+        <p:cNvPr id="1" name=""/>
+        <p:cNvGrpSpPr/>
+        <p:nvPr/>
+      </p:nvGrpSpPr>
+      <p:grpSpPr>
+        <a:xfrm>
+          <a:off x="0" y="0"/>
+          <a:ext cx="0" cy="0"/>
+          <a:chOff x="0" y="0"/>
+          <a:chExt cx="0" cy="0"/>
+        </a:xfrm>
+      </p:grpSpPr>
+      <p:sp>
+        <p:nvSpPr>
+          <p:cNvPr id="2" name="Title 1">
+            <a:extLst>
+              <a:ext uri="{FF2B5EF4-FFF2-40B4-BE49-F238E27FC236}">
+                <a16:creationId xmlns:a16="http://schemas.microsoft.com/office/drawing/2014/main" id="{539FC57C-F99E-40E5-B504-E1A7D3D4C71B}"/>
+              </a:ext>
+            </a:extLst>
+          </p:cNvPr>
+          <p:cNvSpPr>
+            <a:spLocks noGrp="1"/>
+          </p:cNvSpPr>
+          <p:nvPr>
+            <p:ph type="title"/>
+          </p:nvPr>
+        </p:nvSpPr>
+        <p:spPr/>
+        <p:txBody>
+          <a:bodyPr/>
+          <a:lstStyle/>
+          <a:p>
+            <a:r>
+              <a:rPr lang="en-US" dirty="0"/>
+              <a:t>Do NOT use 3D and pie charts!</a:t>
+            </a:r>
+          </a:p>
+        </p:txBody>
+      </p:sp>
+      <p:pic>
+        <p:nvPicPr>
+          <p:cNvPr id="3" name="Picture 2">
+            <a:extLst>
+              <a:ext uri="{FF2B5EF4-FFF2-40B4-BE49-F238E27FC236}">
+                <a16:creationId xmlns:a16="http://schemas.microsoft.com/office/drawing/2014/main" id="{35C3A405-7808-4FA0-A669-CA660AFA05CC}"/>
+              </a:ext>
+            </a:extLst>
+          </p:cNvPr>
+          <p:cNvPicPr>
+            <a:picLocks noChangeAspect="1"/>
+          </p:cNvPicPr>
+          <p:nvPr/>
+        </p:nvPicPr>
+        <p:blipFill>
+          <a:blip r:embed="rId2"/>
+          <a:stretch>
+            <a:fillRect/>
+          </a:stretch>
+        </p:blipFill>
+        <p:spPr>
+          <a:xfrm>
             <a:off x="838199" y="1666316"/>
             <a:ext cx="5246639" cy="3578678"/>
           </a:xfrm>
@@ -8559,6 +8743,210 @@
     <p:extLst>
       <p:ext uri="{BB962C8B-B14F-4D97-AF65-F5344CB8AC3E}">
         <p14:creationId xmlns:p14="http://schemas.microsoft.com/office/powerpoint/2010/main" val="219283342"/>
+      </p:ext>
+    </p:extLst>
+  </p:cSld>
+  <p:clrMapOvr>
+    <a:masterClrMapping/>
+  </p:clrMapOvr>
+</p:sld>
+</file>
+
+<file path=ppt/slides/slide46.xml><?xml version="1.0" encoding="utf-8"?>
+<p:sld xmlns:a="http://schemas.openxmlformats.org/drawingml/2006/main" xmlns:r="http://schemas.openxmlformats.org/officeDocument/2006/relationships" xmlns:p="http://schemas.openxmlformats.org/presentationml/2006/main">
+  <p:cSld>
+    <p:spTree>
+      <p:nvGrpSpPr>
+        <p:cNvPr id="1" name=""/>
+        <p:cNvGrpSpPr/>
+        <p:nvPr/>
+      </p:nvGrpSpPr>
+      <p:grpSpPr>
+        <a:xfrm>
+          <a:off x="0" y="0"/>
+          <a:ext cx="0" cy="0"/>
+          <a:chOff x="0" y="0"/>
+          <a:chExt cx="0" cy="0"/>
+        </a:xfrm>
+      </p:grpSpPr>
+      <p:sp>
+        <p:nvSpPr>
+          <p:cNvPr id="2" name="Title 1">
+            <a:extLst>
+              <a:ext uri="{FF2B5EF4-FFF2-40B4-BE49-F238E27FC236}">
+                <a16:creationId xmlns:a16="http://schemas.microsoft.com/office/drawing/2014/main" id="{504E7F82-AB43-41C2-B5D9-E7D50BE83A4C}"/>
+              </a:ext>
+            </a:extLst>
+          </p:cNvPr>
+          <p:cNvSpPr>
+            <a:spLocks noGrp="1"/>
+          </p:cNvSpPr>
+          <p:nvPr>
+            <p:ph type="title"/>
+          </p:nvPr>
+        </p:nvSpPr>
+        <p:spPr/>
+        <p:txBody>
+          <a:bodyPr/>
+          <a:lstStyle/>
+          <a:p>
+            <a:r>
+              <a:rPr lang="en-US" dirty="0"/>
+              <a:t>Next week</a:t>
+            </a:r>
+          </a:p>
+        </p:txBody>
+      </p:sp>
+      <p:sp>
+        <p:nvSpPr>
+          <p:cNvPr id="3" name="Text Placeholder 2">
+            <a:extLst>
+              <a:ext uri="{FF2B5EF4-FFF2-40B4-BE49-F238E27FC236}">
+                <a16:creationId xmlns:a16="http://schemas.microsoft.com/office/drawing/2014/main" id="{1419120D-1530-47A0-A5CF-15256C1B4113}"/>
+              </a:ext>
+            </a:extLst>
+          </p:cNvPr>
+          <p:cNvSpPr>
+            <a:spLocks noGrp="1"/>
+          </p:cNvSpPr>
+          <p:nvPr>
+            <p:ph type="body" idx="1"/>
+          </p:nvPr>
+        </p:nvSpPr>
+        <p:spPr/>
+        <p:txBody>
+          <a:bodyPr/>
+          <a:lstStyle/>
+          <a:p>
+            <a:endParaRPr lang="en-US" dirty="0"/>
+          </a:p>
+        </p:txBody>
+      </p:sp>
+    </p:spTree>
+    <p:extLst>
+      <p:ext uri="{BB962C8B-B14F-4D97-AF65-F5344CB8AC3E}">
+        <p14:creationId xmlns:p14="http://schemas.microsoft.com/office/powerpoint/2010/main" val="3109420170"/>
+      </p:ext>
+    </p:extLst>
+  </p:cSld>
+  <p:clrMapOvr>
+    <a:masterClrMapping/>
+  </p:clrMapOvr>
+</p:sld>
+</file>
+
+<file path=ppt/slides/slide47.xml><?xml version="1.0" encoding="utf-8"?>
+<p:sld xmlns:a="http://schemas.openxmlformats.org/drawingml/2006/main" xmlns:r="http://schemas.openxmlformats.org/officeDocument/2006/relationships" xmlns:p="http://schemas.openxmlformats.org/presentationml/2006/main">
+  <p:cSld>
+    <p:spTree>
+      <p:nvGrpSpPr>
+        <p:cNvPr id="1" name=""/>
+        <p:cNvGrpSpPr/>
+        <p:nvPr/>
+      </p:nvGrpSpPr>
+      <p:grpSpPr>
+        <a:xfrm>
+          <a:off x="0" y="0"/>
+          <a:ext cx="0" cy="0"/>
+          <a:chOff x="0" y="0"/>
+          <a:chExt cx="0" cy="0"/>
+        </a:xfrm>
+      </p:grpSpPr>
+      <p:sp>
+        <p:nvSpPr>
+          <p:cNvPr id="2" name="Title 1">
+            <a:extLst>
+              <a:ext uri="{FF2B5EF4-FFF2-40B4-BE49-F238E27FC236}">
+                <a16:creationId xmlns:a16="http://schemas.microsoft.com/office/drawing/2014/main" id="{DD371923-B3C2-40B0-B81E-331D3C77B2C1}"/>
+              </a:ext>
+            </a:extLst>
+          </p:cNvPr>
+          <p:cNvSpPr>
+            <a:spLocks noGrp="1"/>
+          </p:cNvSpPr>
+          <p:nvPr>
+            <p:ph type="title"/>
+          </p:nvPr>
+        </p:nvSpPr>
+        <p:spPr/>
+        <p:txBody>
+          <a:bodyPr/>
+          <a:lstStyle/>
+          <a:p>
+            <a:r>
+              <a:rPr lang="en-US" dirty="0"/>
+              <a:t>Topics &amp; Readings</a:t>
+            </a:r>
+          </a:p>
+        </p:txBody>
+      </p:sp>
+      <p:sp>
+        <p:nvSpPr>
+          <p:cNvPr id="3" name="Content Placeholder 2">
+            <a:extLst>
+              <a:ext uri="{FF2B5EF4-FFF2-40B4-BE49-F238E27FC236}">
+                <a16:creationId xmlns:a16="http://schemas.microsoft.com/office/drawing/2014/main" id="{9B6B75C9-DE3D-4C99-BBA9-774B87CBF801}"/>
+              </a:ext>
+            </a:extLst>
+          </p:cNvPr>
+          <p:cNvSpPr>
+            <a:spLocks noGrp="1"/>
+          </p:cNvSpPr>
+          <p:nvPr>
+            <p:ph idx="1"/>
+          </p:nvPr>
+        </p:nvSpPr>
+        <p:spPr/>
+        <p:txBody>
+          <a:bodyPr/>
+          <a:lstStyle/>
+          <a:p>
+            <a:pPr marL="0" indent="0">
+              <a:buNone/>
+            </a:pPr>
+            <a:r>
+              <a:rPr lang="en-US" dirty="0"/>
+              <a:t>Introduction to probability and probability distributions</a:t>
+            </a:r>
+          </a:p>
+          <a:p>
+            <a:r>
+              <a:rPr lang="en-US" dirty="0"/>
+              <a:t>Vu textbook: Pages 89 – 116 (ending with Bayes theorem)</a:t>
+            </a:r>
+          </a:p>
+          <a:p>
+            <a:endParaRPr lang="en-US" dirty="0"/>
+          </a:p>
+          <a:p>
+            <a:pPr marL="0" indent="0">
+              <a:buNone/>
+            </a:pPr>
+            <a:r>
+              <a:rPr lang="en-US" dirty="0"/>
+              <a:t>Introduction to null hypothesis testing</a:t>
+            </a:r>
+          </a:p>
+          <a:p>
+            <a:r>
+              <a:rPr lang="en-US" dirty="0"/>
+              <a:t>Cohen, 1994: The earth is round, b &lt; 0.05. (added to readings folder </a:t>
+            </a:r>
+            <a:r>
+              <a:rPr lang="en-US"/>
+              <a:t>on Canvas)</a:t>
+            </a:r>
+            <a:endParaRPr lang="en-US" dirty="0"/>
+          </a:p>
+          <a:p>
+            <a:endParaRPr lang="en-US" dirty="0"/>
+          </a:p>
+        </p:txBody>
+      </p:sp>
+    </p:spTree>
+    <p:extLst>
+      <p:ext uri="{BB962C8B-B14F-4D97-AF65-F5344CB8AC3E}">
+        <p14:creationId xmlns:p14="http://schemas.microsoft.com/office/powerpoint/2010/main" val="3709092660"/>
       </p:ext>
     </p:extLst>
   </p:cSld>

</xml_diff>